<commit_message>
Adjusted Model Comparison Parameter
</commit_message>
<xml_diff>
--- a/NLP 2 - Hotel Reviews Deliverable.pptx
+++ b/NLP 2 - Hotel Reviews Deliverable.pptx
@@ -11,7 +11,7 @@
     <p:sldId id="274" r:id="rId5"/>
     <p:sldId id="264" r:id="rId6"/>
     <p:sldId id="265" r:id="rId7"/>
-    <p:sldId id="259" r:id="rId8"/>
+    <p:sldId id="275" r:id="rId8"/>
     <p:sldId id="266" r:id="rId9"/>
     <p:sldId id="272" r:id="rId10"/>
     <p:sldId id="260" r:id="rId11"/>
@@ -127,6 +127,10 @@
 </p:presentation>
 </file>
 
+<file path=ppt/revisionInfo.xml><?xml version="1.0" encoding="utf-8"?>
+<p1510:revInfo xmlns:a="http://schemas.openxmlformats.org/drawingml/2006/main" xmlns:r="http://schemas.openxmlformats.org/officeDocument/2006/relationships" xmlns:p1510="http://schemas.microsoft.com/office/powerpoint/2015/10/main"/>
+</file>
+
 <file path=ppt/slideLayouts/slideLayout1.xml><?xml version="1.0" encoding="utf-8"?>
 <p:sldLayout xmlns:a="http://schemas.openxmlformats.org/drawingml/2006/main" xmlns:r="http://schemas.openxmlformats.org/officeDocument/2006/relationships" xmlns:p="http://schemas.openxmlformats.org/presentationml/2006/main" type="title" preserve="1">
   <p:cSld name="Title Slide">
@@ -256,7 +260,7 @@
           <a:p>
             <a:fld id="{9FA286B8-7381-4FAB-B87D-163232FF37BF}" type="datetimeFigureOut">
               <a:rPr lang="en-US" smtClean="0"/>
-              <a:t>8/23/2017</a:t>
+              <a:t>9/20/2017</a:t>
             </a:fld>
             <a:endParaRPr lang="en-US" dirty="0"/>
           </a:p>
@@ -424,7 +428,7 @@
           <a:p>
             <a:fld id="{9FA286B8-7381-4FAB-B87D-163232FF37BF}" type="datetimeFigureOut">
               <a:rPr lang="en-US" smtClean="0"/>
-              <a:t>8/23/2017</a:t>
+              <a:t>9/20/2017</a:t>
             </a:fld>
             <a:endParaRPr lang="en-US" dirty="0"/>
           </a:p>
@@ -602,7 +606,7 @@
           <a:p>
             <a:fld id="{9FA286B8-7381-4FAB-B87D-163232FF37BF}" type="datetimeFigureOut">
               <a:rPr lang="en-US" smtClean="0"/>
-              <a:t>8/23/2017</a:t>
+              <a:t>9/20/2017</a:t>
             </a:fld>
             <a:endParaRPr lang="en-US" dirty="0"/>
           </a:p>
@@ -770,7 +774,7 @@
           <a:p>
             <a:fld id="{9FA286B8-7381-4FAB-B87D-163232FF37BF}" type="datetimeFigureOut">
               <a:rPr lang="en-US" smtClean="0"/>
-              <a:t>8/23/2017</a:t>
+              <a:t>9/20/2017</a:t>
             </a:fld>
             <a:endParaRPr lang="en-US" dirty="0"/>
           </a:p>
@@ -1015,7 +1019,7 @@
           <a:p>
             <a:fld id="{9FA286B8-7381-4FAB-B87D-163232FF37BF}" type="datetimeFigureOut">
               <a:rPr lang="en-US" smtClean="0"/>
-              <a:t>8/23/2017</a:t>
+              <a:t>9/20/2017</a:t>
             </a:fld>
             <a:endParaRPr lang="en-US" dirty="0"/>
           </a:p>
@@ -1244,7 +1248,7 @@
           <a:p>
             <a:fld id="{9FA286B8-7381-4FAB-B87D-163232FF37BF}" type="datetimeFigureOut">
               <a:rPr lang="en-US" smtClean="0"/>
-              <a:t>8/23/2017</a:t>
+              <a:t>9/20/2017</a:t>
             </a:fld>
             <a:endParaRPr lang="en-US" dirty="0"/>
           </a:p>
@@ -1608,7 +1612,7 @@
           <a:p>
             <a:fld id="{9FA286B8-7381-4FAB-B87D-163232FF37BF}" type="datetimeFigureOut">
               <a:rPr lang="en-US" smtClean="0"/>
-              <a:t>8/23/2017</a:t>
+              <a:t>9/20/2017</a:t>
             </a:fld>
             <a:endParaRPr lang="en-US" dirty="0"/>
           </a:p>
@@ -1725,7 +1729,7 @@
           <a:p>
             <a:fld id="{9FA286B8-7381-4FAB-B87D-163232FF37BF}" type="datetimeFigureOut">
               <a:rPr lang="en-US" smtClean="0"/>
-              <a:t>8/23/2017</a:t>
+              <a:t>9/20/2017</a:t>
             </a:fld>
             <a:endParaRPr lang="en-US" dirty="0"/>
           </a:p>
@@ -1820,7 +1824,7 @@
           <a:p>
             <a:fld id="{9FA286B8-7381-4FAB-B87D-163232FF37BF}" type="datetimeFigureOut">
               <a:rPr lang="en-US" smtClean="0"/>
-              <a:t>8/23/2017</a:t>
+              <a:t>9/20/2017</a:t>
             </a:fld>
             <a:endParaRPr lang="en-US" dirty="0"/>
           </a:p>
@@ -2095,7 +2099,7 @@
           <a:p>
             <a:fld id="{9FA286B8-7381-4FAB-B87D-163232FF37BF}" type="datetimeFigureOut">
               <a:rPr lang="en-US" smtClean="0"/>
-              <a:t>8/23/2017</a:t>
+              <a:t>9/20/2017</a:t>
             </a:fld>
             <a:endParaRPr lang="en-US" dirty="0"/>
           </a:p>
@@ -2347,7 +2351,7 @@
           <a:p>
             <a:fld id="{9FA286B8-7381-4FAB-B87D-163232FF37BF}" type="datetimeFigureOut">
               <a:rPr lang="en-US" smtClean="0"/>
-              <a:t>8/23/2017</a:t>
+              <a:t>9/20/2017</a:t>
             </a:fld>
             <a:endParaRPr lang="en-US" dirty="0"/>
           </a:p>
@@ -2558,7 +2562,7 @@
           <a:p>
             <a:fld id="{9FA286B8-7381-4FAB-B87D-163232FF37BF}" type="datetimeFigureOut">
               <a:rPr lang="en-US" smtClean="0"/>
-              <a:t>8/23/2017</a:t>
+              <a:t>9/20/2017</a:t>
             </a:fld>
             <a:endParaRPr lang="en-US" dirty="0"/>
           </a:p>
@@ -4484,95 +4488,6 @@
           </a:p>
         </p:txBody>
       </p:sp>
-      <p:pic>
-        <p:nvPicPr>
-          <p:cNvPr id="6" name="Content Placeholder 5"/>
-          <p:cNvPicPr>
-            <a:picLocks noGrp="1" noChangeAspect="1"/>
-          </p:cNvPicPr>
-          <p:nvPr>
-            <p:ph idx="1"/>
-          </p:nvPr>
-        </p:nvPicPr>
-        <p:blipFill>
-          <a:blip r:embed="rId2">
-            <a:extLst>
-              <a:ext uri="{28A0092B-C50C-407E-A947-70E740481C1C}">
-                <a14:useLocalDpi xmlns:a14="http://schemas.microsoft.com/office/drawing/2010/main" val="0"/>
-              </a:ext>
-            </a:extLst>
-          </a:blip>
-          <a:stretch>
-            <a:fillRect/>
-          </a:stretch>
-        </p:blipFill>
-        <p:spPr>
-          <a:xfrm>
-            <a:off x="8773631" y="2235262"/>
-            <a:ext cx="3060064" cy="3195183"/>
-          </a:xfrm>
-        </p:spPr>
-      </p:pic>
-      <p:pic>
-        <p:nvPicPr>
-          <p:cNvPr id="8" name="Picture 7"/>
-          <p:cNvPicPr>
-            <a:picLocks noChangeAspect="1"/>
-          </p:cNvPicPr>
-          <p:nvPr/>
-        </p:nvPicPr>
-        <p:blipFill>
-          <a:blip r:embed="rId3">
-            <a:extLst>
-              <a:ext uri="{28A0092B-C50C-407E-A947-70E740481C1C}">
-                <a14:useLocalDpi xmlns:a14="http://schemas.microsoft.com/office/drawing/2010/main" val="0"/>
-              </a:ext>
-            </a:extLst>
-          </a:blip>
-          <a:stretch>
-            <a:fillRect/>
-          </a:stretch>
-        </p:blipFill>
-        <p:spPr>
-          <a:xfrm>
-            <a:off x="1157891" y="2219338"/>
-            <a:ext cx="3107753" cy="3211080"/>
-          </a:xfrm>
-          <a:prstGeom prst="rect">
-            <a:avLst/>
-          </a:prstGeom>
-        </p:spPr>
-      </p:pic>
-      <p:pic>
-        <p:nvPicPr>
-          <p:cNvPr id="10" name="Picture 9"/>
-          <p:cNvPicPr>
-            <a:picLocks noChangeAspect="1"/>
-          </p:cNvPicPr>
-          <p:nvPr/>
-        </p:nvPicPr>
-        <p:blipFill>
-          <a:blip r:embed="rId4">
-            <a:extLst>
-              <a:ext uri="{28A0092B-C50C-407E-A947-70E740481C1C}">
-                <a14:useLocalDpi xmlns:a14="http://schemas.microsoft.com/office/drawing/2010/main" val="0"/>
-              </a:ext>
-            </a:extLst>
-          </a:blip>
-          <a:stretch>
-            <a:fillRect/>
-          </a:stretch>
-        </p:blipFill>
-        <p:spPr>
-          <a:xfrm>
-            <a:off x="4907336" y="2237999"/>
-            <a:ext cx="3091857" cy="3091857"/>
-          </a:xfrm>
-          <a:prstGeom prst="rect">
-            <a:avLst/>
-          </a:prstGeom>
-        </p:spPr>
-      </p:pic>
       <p:sp>
         <p:nvSpPr>
           <p:cNvPr id="12" name="Rectangle 11"/>
@@ -4671,45 +4586,23 @@
       </p:sp>
       <p:sp>
         <p:nvSpPr>
-          <p:cNvPr id="15" name="Rectangle 14"/>
+          <p:cNvPr id="16" name="Rectangle 15"/>
           <p:cNvSpPr/>
           <p:nvPr/>
         </p:nvSpPr>
         <p:spPr>
           <a:xfrm>
-            <a:off x="4891533" y="3081610"/>
-            <a:ext cx="3245016" cy="3543548"/>
+            <a:off x="1504324" y="5955630"/>
+            <a:ext cx="2419701" cy="369332"/>
           </a:xfrm>
           <a:prstGeom prst="rect">
             <a:avLst/>
           </a:prstGeom>
-          <a:solidFill>
-            <a:schemeClr val="bg2">
-              <a:alpha val="33000"/>
-            </a:schemeClr>
-          </a:solidFill>
-          <a:ln>
-            <a:noFill/>
-          </a:ln>
         </p:spPr>
-        <p:style>
-          <a:lnRef idx="2">
-            <a:schemeClr val="accent1">
-              <a:shade val="50000"/>
-            </a:schemeClr>
-          </a:lnRef>
-          <a:fillRef idx="1">
-            <a:schemeClr val="accent1"/>
-          </a:fillRef>
-          <a:effectRef idx="0">
-            <a:schemeClr val="accent1"/>
-          </a:effectRef>
-          <a:fontRef idx="minor">
-            <a:schemeClr val="lt1"/>
-          </a:fontRef>
-        </p:style>
-        <p:txBody>
-          <a:bodyPr rtlCol="0" anchor="ctr"/>
+        <p:txBody>
+          <a:bodyPr wrap="none">
+            <a:spAutoFit/>
+          </a:bodyPr>
           <a:lstStyle/>
           <a:p>
             <a:pPr algn="ctr"/>
@@ -4718,11 +4611,101 @@
                 <a:latin typeface="Segoe UI Light" panose="020B0502040204020203" pitchFamily="34" charset="0"/>
                 <a:cs typeface="Segoe UI Light" panose="020B0502040204020203" pitchFamily="34" charset="0"/>
               </a:rPr>
-              <a:t>Previous + Parts of Speech Metrics</a:t>
-            </a:r>
-          </a:p>
-        </p:txBody>
-      </p:sp>
+              <a:t>LDA performs the best.</a:t>
+            </a:r>
+          </a:p>
+        </p:txBody>
+      </p:sp>
+      <p:pic>
+        <p:nvPicPr>
+          <p:cNvPr id="3" name="Picture 2">
+            <a:extLst>
+              <a:ext uri="{FF2B5EF4-FFF2-40B4-BE49-F238E27FC236}">
+                <a16:creationId xmlns:a16="http://schemas.microsoft.com/office/drawing/2014/main" id="{A2A7E087-068A-4DD3-8659-1D4160FB4BD2}"/>
+              </a:ext>
+            </a:extLst>
+          </p:cNvPr>
+          <p:cNvPicPr>
+            <a:picLocks noChangeAspect="1"/>
+          </p:cNvPicPr>
+          <p:nvPr/>
+        </p:nvPicPr>
+        <p:blipFill>
+          <a:blip r:embed="rId2"/>
+          <a:stretch>
+            <a:fillRect/>
+          </a:stretch>
+        </p:blipFill>
+        <p:spPr>
+          <a:xfrm>
+            <a:off x="953348" y="2154172"/>
+            <a:ext cx="3464750" cy="3738939"/>
+          </a:xfrm>
+          <a:prstGeom prst="rect">
+            <a:avLst/>
+          </a:prstGeom>
+        </p:spPr>
+      </p:pic>
+      <p:pic>
+        <p:nvPicPr>
+          <p:cNvPr id="7" name="Picture 6">
+            <a:extLst>
+              <a:ext uri="{FF2B5EF4-FFF2-40B4-BE49-F238E27FC236}">
+                <a16:creationId xmlns:a16="http://schemas.microsoft.com/office/drawing/2014/main" id="{C8729CC7-5648-45B3-AEA3-5AD68FC8CCFB}"/>
+              </a:ext>
+            </a:extLst>
+          </p:cNvPr>
+          <p:cNvPicPr>
+            <a:picLocks noChangeAspect="1"/>
+          </p:cNvPicPr>
+          <p:nvPr/>
+        </p:nvPicPr>
+        <p:blipFill>
+          <a:blip r:embed="rId3"/>
+          <a:stretch>
+            <a:fillRect/>
+          </a:stretch>
+        </p:blipFill>
+        <p:spPr>
+          <a:xfrm>
+            <a:off x="4539652" y="2154172"/>
+            <a:ext cx="3489676" cy="3705704"/>
+          </a:xfrm>
+          <a:prstGeom prst="rect">
+            <a:avLst/>
+          </a:prstGeom>
+        </p:spPr>
+      </p:pic>
+      <p:pic>
+        <p:nvPicPr>
+          <p:cNvPr id="9" name="Picture 8">
+            <a:extLst>
+              <a:ext uri="{FF2B5EF4-FFF2-40B4-BE49-F238E27FC236}">
+                <a16:creationId xmlns:a16="http://schemas.microsoft.com/office/drawing/2014/main" id="{BBF78E02-66DE-4787-B72A-7245C6A287F8}"/>
+              </a:ext>
+            </a:extLst>
+          </p:cNvPr>
+          <p:cNvPicPr>
+            <a:picLocks noChangeAspect="1"/>
+          </p:cNvPicPr>
+          <p:nvPr/>
+        </p:nvPicPr>
+        <p:blipFill>
+          <a:blip r:embed="rId4"/>
+          <a:stretch>
+            <a:fillRect/>
+          </a:stretch>
+        </p:blipFill>
+        <p:spPr>
+          <a:xfrm>
+            <a:off x="8488430" y="2228951"/>
+            <a:ext cx="3431515" cy="3664160"/>
+          </a:xfrm>
+          <a:prstGeom prst="rect">
+            <a:avLst/>
+          </a:prstGeom>
+        </p:spPr>
+      </p:pic>
       <p:sp>
         <p:nvSpPr>
           <p:cNvPr id="11" name="Rectangle 10"/>
@@ -4731,8 +4714,8 @@
         </p:nvSpPr>
         <p:spPr>
           <a:xfrm>
-            <a:off x="1157891" y="2387750"/>
-            <a:ext cx="9615711" cy="157470"/>
+            <a:off x="929389" y="2325959"/>
+            <a:ext cx="9976598" cy="163380"/>
           </a:xfrm>
           <a:prstGeom prst="rect">
             <a:avLst/>
@@ -4767,48 +4750,6 @@
           <a:p>
             <a:pPr algn="ctr"/>
             <a:endParaRPr lang="en-US" dirty="0"/>
-          </a:p>
-        </p:txBody>
-      </p:sp>
-      <p:sp>
-        <p:nvSpPr>
-          <p:cNvPr id="16" name="Rectangle 15"/>
-          <p:cNvSpPr/>
-          <p:nvPr/>
-        </p:nvSpPr>
-        <p:spPr>
-          <a:xfrm>
-            <a:off x="5243414" y="5569946"/>
-            <a:ext cx="2419700" cy="646331"/>
-          </a:xfrm>
-          <a:prstGeom prst="rect">
-            <a:avLst/>
-          </a:prstGeom>
-        </p:spPr>
-        <p:txBody>
-          <a:bodyPr wrap="none">
-            <a:spAutoFit/>
-          </a:bodyPr>
-          <a:lstStyle/>
-          <a:p>
-            <a:pPr algn="ctr"/>
-            <a:r>
-              <a:rPr lang="en-US" dirty="0">
-                <a:latin typeface="Segoe UI Light" panose="020B0502040204020203" pitchFamily="34" charset="0"/>
-                <a:cs typeface="Segoe UI Light" panose="020B0502040204020203" pitchFamily="34" charset="0"/>
-              </a:rPr>
-              <a:t>Feature Set 2 + </a:t>
-            </a:r>
-          </a:p>
-          <a:p>
-            <a:pPr algn="ctr"/>
-            <a:r>
-              <a:rPr lang="en-US" dirty="0">
-                <a:latin typeface="Segoe UI Light" panose="020B0502040204020203" pitchFamily="34" charset="0"/>
-                <a:cs typeface="Segoe UI Light" panose="020B0502040204020203" pitchFamily="34" charset="0"/>
-              </a:rPr>
-              <a:t>LDA performs the best.</a:t>
-            </a:r>
           </a:p>
         </p:txBody>
       </p:sp>
@@ -4842,6 +4783,36 @@
           <a:chExt cx="0" cy="0"/>
         </a:xfrm>
       </p:grpSpPr>
+      <p:pic>
+        <p:nvPicPr>
+          <p:cNvPr id="10" name="Picture 9">
+            <a:extLst>
+              <a:ext uri="{FF2B5EF4-FFF2-40B4-BE49-F238E27FC236}">
+                <a16:creationId xmlns:a16="http://schemas.microsoft.com/office/drawing/2014/main" id="{9FF4A0CF-323E-4790-ACFE-C5B53B004394}"/>
+              </a:ext>
+            </a:extLst>
+          </p:cNvPr>
+          <p:cNvPicPr>
+            <a:picLocks noChangeAspect="1"/>
+          </p:cNvPicPr>
+          <p:nvPr/>
+        </p:nvPicPr>
+        <p:blipFill>
+          <a:blip r:embed="rId2"/>
+          <a:stretch>
+            <a:fillRect/>
+          </a:stretch>
+        </p:blipFill>
+        <p:spPr>
+          <a:xfrm>
+            <a:off x="624333" y="1825625"/>
+            <a:ext cx="3464750" cy="3738939"/>
+          </a:xfrm>
+          <a:prstGeom prst="rect">
+            <a:avLst/>
+          </a:prstGeom>
+        </p:spPr>
+      </p:pic>
       <p:sp>
         <p:nvSpPr>
           <p:cNvPr id="2" name="Title 1"/>
@@ -4888,117 +4859,65 @@
           <a:bodyPr/>
           <a:lstStyle/>
           <a:p>
-            <a:pPr marL="0" indent="0">
-              <a:buNone/>
-            </a:pPr>
-            <a:r>
-              <a:rPr lang="en-US" dirty="0">
-                <a:latin typeface="Segoe UI Black" panose="020B0A02040204020203" pitchFamily="34" charset="0"/>
-                <a:ea typeface="Segoe UI Black" panose="020B0A02040204020203" pitchFamily="34" charset="0"/>
-                <a:cs typeface="Segoe UI Black" panose="020B0A02040204020203" pitchFamily="34" charset="0"/>
-              </a:rPr>
-              <a:t>10 Fold Cross Validation Test Results: </a:t>
-            </a:r>
-          </a:p>
-          <a:p>
-            <a:pPr marL="0" indent="0" algn="ctr">
-              <a:buNone/>
-            </a:pPr>
-            <a:endParaRPr lang="en-US" dirty="0">
-              <a:latin typeface="Segoe UI Light" panose="020B0502040204020203" pitchFamily="34" charset="0"/>
-              <a:cs typeface="Segoe UI Light" panose="020B0502040204020203" pitchFamily="34" charset="0"/>
-            </a:endParaRPr>
-          </a:p>
-          <a:p>
-            <a:pPr marL="0" indent="0" algn="ctr">
-              <a:buNone/>
-            </a:pPr>
-            <a:r>
-              <a:rPr lang="en-US" dirty="0">
-                <a:latin typeface="Segoe UI Light" panose="020B0502040204020203" pitchFamily="34" charset="0"/>
-                <a:cs typeface="Segoe UI Light" panose="020B0502040204020203" pitchFamily="34" charset="0"/>
-              </a:rPr>
-              <a:t>Accuracy: 82.25%</a:t>
-            </a:r>
-          </a:p>
-          <a:p>
-            <a:pPr marL="0" indent="0">
-              <a:buNone/>
-            </a:pPr>
-            <a:endParaRPr lang="en-US" dirty="0">
-              <a:latin typeface="Segoe UI Light" panose="020B0502040204020203" pitchFamily="34" charset="0"/>
-              <a:cs typeface="Segoe UI Light" panose="020B0502040204020203" pitchFamily="34" charset="0"/>
-            </a:endParaRPr>
-          </a:p>
-          <a:p>
-            <a:pPr marL="0" indent="0">
-              <a:buNone/>
-            </a:pPr>
-            <a:r>
-              <a:rPr lang="en-US" dirty="0">
-                <a:latin typeface="Segoe UI Black" panose="020B0A02040204020203" pitchFamily="34" charset="0"/>
-                <a:ea typeface="Segoe UI Black" panose="020B0A02040204020203" pitchFamily="34" charset="0"/>
-                <a:cs typeface="Segoe UI Black" panose="020B0A02040204020203" pitchFamily="34" charset="0"/>
-              </a:rPr>
-              <a:t>Confusion Matrix </a:t>
-            </a:r>
-            <a:r>
-              <a:rPr lang="en-US" b="1" dirty="0">
-                <a:latin typeface="Segoe UI Black" panose="020B0A02040204020203" pitchFamily="34" charset="0"/>
-                <a:ea typeface="Segoe UI Black" panose="020B0A02040204020203" pitchFamily="34" charset="0"/>
-                <a:cs typeface="Segoe UI Black" panose="020B0A02040204020203" pitchFamily="34" charset="0"/>
-              </a:rPr>
-              <a:t>on Entire Dataset:</a:t>
-            </a:r>
-          </a:p>
-        </p:txBody>
-      </p:sp>
-      <p:pic>
-        <p:nvPicPr>
-          <p:cNvPr id="17" name="Picture 16"/>
-          <p:cNvPicPr>
-            <a:picLocks noChangeAspect="1"/>
-          </p:cNvPicPr>
+            <a:r>
+              <a:rPr lang="en-US" dirty="0">
+                <a:latin typeface="Segoe UI Light" panose="020B0502040204020203" pitchFamily="34" charset="0"/>
+                <a:cs typeface="Segoe UI Light" panose="020B0502040204020203" pitchFamily="34" charset="0"/>
+              </a:rPr>
+              <a:t>Results might be improved by using Random forest with tuned parameters given that without tuning, the model performed reasonably well</a:t>
+            </a:r>
+          </a:p>
+        </p:txBody>
+      </p:sp>
+      <p:sp>
+        <p:nvSpPr>
+          <p:cNvPr id="19" name="Rectangle 18"/>
+          <p:cNvSpPr/>
           <p:nvPr/>
-        </p:nvPicPr>
-        <p:blipFill>
-          <a:blip r:embed="rId2">
-            <a:extLst>
-              <a:ext uri="{28A0092B-C50C-407E-A947-70E740481C1C}">
-                <a14:useLocalDpi xmlns:a14="http://schemas.microsoft.com/office/drawing/2010/main" val="0"/>
-              </a:ext>
-            </a:extLst>
-          </a:blip>
-          <a:stretch>
-            <a:fillRect/>
-          </a:stretch>
-        </p:blipFill>
+        </p:nvSpPr>
         <p:spPr>
           <a:xfrm>
-            <a:off x="640136" y="1825625"/>
-            <a:ext cx="3091857" cy="3091857"/>
+            <a:off x="1096949" y="5532088"/>
+            <a:ext cx="1959062" cy="369332"/>
           </a:xfrm>
           <a:prstGeom prst="rect">
             <a:avLst/>
           </a:prstGeom>
         </p:spPr>
-      </p:pic>
-      <p:sp>
-        <p:nvSpPr>
-          <p:cNvPr id="18" name="Rectangle 17"/>
+        <p:txBody>
+          <a:bodyPr wrap="none">
+            <a:spAutoFit/>
+          </a:bodyPr>
+          <a:lstStyle/>
+          <a:p>
+            <a:pPr algn="ctr"/>
+            <a:r>
+              <a:rPr lang="en-US" dirty="0">
+                <a:latin typeface="Segoe UI Light" panose="020B0502040204020203" pitchFamily="34" charset="0"/>
+                <a:cs typeface="Segoe UI Light" panose="020B0502040204020203" pitchFamily="34" charset="0"/>
+              </a:rPr>
+              <a:t>Topic Vectors Only</a:t>
+            </a:r>
+          </a:p>
+        </p:txBody>
+      </p:sp>
+      <p:sp>
+        <p:nvSpPr>
+          <p:cNvPr id="20" name="Rectangle 19"/>
           <p:cNvSpPr/>
           <p:nvPr/>
         </p:nvSpPr>
         <p:spPr>
           <a:xfrm>
-            <a:off x="624333" y="4917482"/>
-            <a:ext cx="3245016" cy="1295302"/>
+            <a:off x="613468" y="2006375"/>
+            <a:ext cx="1741038" cy="130336"/>
           </a:xfrm>
           <a:prstGeom prst="rect">
             <a:avLst/>
           </a:prstGeom>
           <a:solidFill>
-            <a:schemeClr val="bg2">
+            <a:schemeClr val="accent6">
+              <a:lumMod val="50000"/>
               <a:alpha val="33000"/>
             </a:schemeClr>
           </a:solidFill>
@@ -5027,74 +4946,39 @@
           <a:lstStyle/>
           <a:p>
             <a:pPr algn="ctr"/>
-            <a:r>
-              <a:rPr lang="en-US" dirty="0">
-                <a:latin typeface="Segoe UI Light" panose="020B0502040204020203" pitchFamily="34" charset="0"/>
-                <a:cs typeface="Segoe UI Light" panose="020B0502040204020203" pitchFamily="34" charset="0"/>
-              </a:rPr>
-              <a:t>Previous + Parts of Speech Metrics</a:t>
-            </a:r>
-          </a:p>
-        </p:txBody>
-      </p:sp>
-      <p:sp>
-        <p:nvSpPr>
-          <p:cNvPr id="19" name="Rectangle 18"/>
+            <a:endParaRPr lang="en-US" dirty="0">
+              <a:solidFill>
+                <a:srgbClr val="FF0000"/>
+              </a:solidFill>
+              <a:latin typeface="Segoe UI Light" panose="020B0502040204020203" pitchFamily="34" charset="0"/>
+              <a:cs typeface="Segoe UI Light" panose="020B0502040204020203" pitchFamily="34" charset="0"/>
+            </a:endParaRPr>
+          </a:p>
+        </p:txBody>
+      </p:sp>
+      <p:sp>
+        <p:nvSpPr>
+          <p:cNvPr id="12" name="Rectangle 11">
+            <a:extLst>
+              <a:ext uri="{FF2B5EF4-FFF2-40B4-BE49-F238E27FC236}">
+                <a16:creationId xmlns:a16="http://schemas.microsoft.com/office/drawing/2014/main" id="{C06C2AE0-8E38-4D27-9027-E2394F36B658}"/>
+              </a:ext>
+            </a:extLst>
+          </p:cNvPr>
           <p:cNvSpPr/>
           <p:nvPr/>
         </p:nvSpPr>
         <p:spPr>
           <a:xfrm>
-            <a:off x="976214" y="5157572"/>
-            <a:ext cx="2419700" cy="646331"/>
-          </a:xfrm>
-          <a:prstGeom prst="rect">
-            <a:avLst/>
-          </a:prstGeom>
-        </p:spPr>
-        <p:txBody>
-          <a:bodyPr wrap="none">
-            <a:spAutoFit/>
-          </a:bodyPr>
-          <a:lstStyle/>
-          <a:p>
-            <a:pPr algn="ctr"/>
-            <a:r>
-              <a:rPr lang="en-US" dirty="0">
-                <a:latin typeface="Segoe UI Light" panose="020B0502040204020203" pitchFamily="34" charset="0"/>
-                <a:cs typeface="Segoe UI Light" panose="020B0502040204020203" pitchFamily="34" charset="0"/>
-              </a:rPr>
-              <a:t>Feature Set 2 + </a:t>
-            </a:r>
-          </a:p>
-          <a:p>
-            <a:pPr algn="ctr"/>
-            <a:r>
-              <a:rPr lang="en-US" dirty="0">
-                <a:latin typeface="Segoe UI Light" panose="020B0502040204020203" pitchFamily="34" charset="0"/>
-                <a:cs typeface="Segoe UI Light" panose="020B0502040204020203" pitchFamily="34" charset="0"/>
-              </a:rPr>
-              <a:t>LDA performs the best.</a:t>
-            </a:r>
-          </a:p>
-        </p:txBody>
-      </p:sp>
-      <p:sp>
-        <p:nvSpPr>
-          <p:cNvPr id="20" name="Rectangle 19"/>
-          <p:cNvSpPr/>
-          <p:nvPr/>
-        </p:nvSpPr>
-        <p:spPr>
-          <a:xfrm>
-            <a:off x="624333" y="1978383"/>
-            <a:ext cx="3245016" cy="134386"/>
+            <a:off x="613468" y="2765264"/>
+            <a:ext cx="1741038" cy="130336"/>
           </a:xfrm>
           <a:prstGeom prst="rect">
             <a:avLst/>
           </a:prstGeom>
           <a:solidFill>
-            <a:schemeClr val="bg2">
+            <a:schemeClr val="accent6">
+              <a:lumMod val="50000"/>
               <a:alpha val="33000"/>
             </a:schemeClr>
           </a:solidFill>
@@ -5124,81 +5008,9 @@
           <a:p>
             <a:pPr algn="ctr"/>
             <a:endParaRPr lang="en-US" dirty="0">
-              <a:latin typeface="Segoe UI Light" panose="020B0502040204020203" pitchFamily="34" charset="0"/>
-              <a:cs typeface="Segoe UI Light" panose="020B0502040204020203" pitchFamily="34" charset="0"/>
-            </a:endParaRPr>
-          </a:p>
-        </p:txBody>
-      </p:sp>
-      <p:pic>
-        <p:nvPicPr>
-          <p:cNvPr id="4" name="Picture 3"/>
-          <p:cNvPicPr>
-            <a:picLocks noChangeAspect="1"/>
-          </p:cNvPicPr>
-          <p:nvPr/>
-        </p:nvPicPr>
-        <p:blipFill>
-          <a:blip r:embed="rId3"/>
-          <a:stretch>
-            <a:fillRect/>
-          </a:stretch>
-        </p:blipFill>
-        <p:spPr>
-          <a:xfrm>
-            <a:off x="4838700" y="4441010"/>
-            <a:ext cx="5981700" cy="1676400"/>
-          </a:xfrm>
-          <a:prstGeom prst="rect">
-            <a:avLst/>
-          </a:prstGeom>
-        </p:spPr>
-      </p:pic>
-      <p:sp>
-        <p:nvSpPr>
-          <p:cNvPr id="21" name="Rectangle 20"/>
-          <p:cNvSpPr/>
-          <p:nvPr/>
-        </p:nvSpPr>
-        <p:spPr>
-          <a:xfrm>
-            <a:off x="1370098" y="3002956"/>
-            <a:ext cx="506327" cy="1914525"/>
-          </a:xfrm>
-          <a:prstGeom prst="rect">
-            <a:avLst/>
-          </a:prstGeom>
-          <a:solidFill>
-            <a:schemeClr val="bg2">
-              <a:alpha val="33000"/>
-            </a:schemeClr>
-          </a:solidFill>
-          <a:ln>
-            <a:noFill/>
-          </a:ln>
-        </p:spPr>
-        <p:style>
-          <a:lnRef idx="2">
-            <a:schemeClr val="accent1">
-              <a:shade val="50000"/>
-            </a:schemeClr>
-          </a:lnRef>
-          <a:fillRef idx="1">
-            <a:schemeClr val="accent1"/>
-          </a:fillRef>
-          <a:effectRef idx="0">
-            <a:schemeClr val="accent1"/>
-          </a:effectRef>
-          <a:fontRef idx="minor">
-            <a:schemeClr val="lt1"/>
-          </a:fontRef>
-        </p:style>
-        <p:txBody>
-          <a:bodyPr rtlCol="0" anchor="ctr"/>
-          <a:lstStyle/>
-          <a:p>
-            <a:pPr algn="ctr"/>
-            <a:endParaRPr lang="en-US" dirty="0">
+              <a:solidFill>
+                <a:srgbClr val="FF0000"/>
+              </a:solidFill>
               <a:latin typeface="Segoe UI Light" panose="020B0502040204020203" pitchFamily="34" charset="0"/>
               <a:cs typeface="Segoe UI Light" panose="020B0502040204020203" pitchFamily="34" charset="0"/>
             </a:endParaRPr>
@@ -6005,9 +5817,541 @@
           <a:chExt cx="0" cy="0"/>
         </a:xfrm>
       </p:grpSpPr>
-      <p:sp>
-        <p:nvSpPr>
-          <p:cNvPr id="2" name="Title 1"/>
+      <p:graphicFrame>
+        <p:nvGraphicFramePr>
+          <p:cNvPr id="11" name="Table 10">
+            <a:extLst>
+              <a:ext uri="{FF2B5EF4-FFF2-40B4-BE49-F238E27FC236}">
+                <a16:creationId xmlns:a16="http://schemas.microsoft.com/office/drawing/2014/main" id="{691A4642-FC63-45E3-8A7A-7F7C9B9EEA35}"/>
+              </a:ext>
+            </a:extLst>
+          </p:cNvPr>
+          <p:cNvGraphicFramePr>
+            <a:graphicFrameLocks noGrp="1"/>
+          </p:cNvGraphicFramePr>
+          <p:nvPr>
+            <p:extLst>
+              <p:ext uri="{D42A27DB-BD31-4B8C-83A1-F6EECF244321}">
+                <p14:modId xmlns:p14="http://schemas.microsoft.com/office/powerpoint/2010/main" val="2264737333"/>
+              </p:ext>
+            </p:extLst>
+          </p:nvPr>
+        </p:nvGraphicFramePr>
+        <p:xfrm>
+          <a:off x="737532" y="2165709"/>
+          <a:ext cx="10515600" cy="2949716"/>
+        </p:xfrm>
+        <a:graphic>
+          <a:graphicData uri="http://schemas.openxmlformats.org/drawingml/2006/table">
+            <a:tbl>
+              <a:tblPr/>
+              <a:tblGrid>
+                <a:gridCol w="1140675">
+                  <a:extLst>
+                    <a:ext uri="{9D8B030D-6E8A-4147-A177-3AD203B41FA5}">
+                      <a16:colId xmlns:a16="http://schemas.microsoft.com/office/drawing/2014/main" val="2834686154"/>
+                    </a:ext>
+                  </a:extLst>
+                </a:gridCol>
+                <a:gridCol w="4800342">
+                  <a:extLst>
+                    <a:ext uri="{9D8B030D-6E8A-4147-A177-3AD203B41FA5}">
+                      <a16:colId xmlns:a16="http://schemas.microsoft.com/office/drawing/2014/main" val="717536827"/>
+                    </a:ext>
+                  </a:extLst>
+                </a:gridCol>
+                <a:gridCol w="4574583">
+                  <a:extLst>
+                    <a:ext uri="{9D8B030D-6E8A-4147-A177-3AD203B41FA5}">
+                      <a16:colId xmlns:a16="http://schemas.microsoft.com/office/drawing/2014/main" val="3055921651"/>
+                    </a:ext>
+                  </a:extLst>
+                </a:gridCol>
+              </a:tblGrid>
+              <a:tr h="196054">
+                <a:tc>
+                  <a:txBody>
+                    <a:bodyPr/>
+                    <a:lstStyle/>
+                    <a:p>
+                      <a:pPr algn="l" fontAlgn="b"/>
+                      <a:endParaRPr lang="en-US" sz="1000" b="0" i="0" u="none" strike="noStrike">
+                        <a:solidFill>
+                          <a:srgbClr val="000000"/>
+                        </a:solidFill>
+                        <a:effectLst/>
+                        <a:latin typeface="Calibri" panose="020F0502020204030204" pitchFamily="34" charset="0"/>
+                      </a:endParaRPr>
+                    </a:p>
+                  </a:txBody>
+                  <a:tcPr marL="8912" marR="8912" marT="8912" marB="0" anchor="b">
+                    <a:lnL>
+                      <a:noFill/>
+                    </a:lnL>
+                    <a:lnR>
+                      <a:noFill/>
+                    </a:lnR>
+                    <a:lnT>
+                      <a:noFill/>
+                    </a:lnT>
+                    <a:lnB>
+                      <a:noFill/>
+                    </a:lnB>
+                  </a:tcPr>
+                </a:tc>
+                <a:tc>
+                  <a:txBody>
+                    <a:bodyPr/>
+                    <a:lstStyle/>
+                    <a:p>
+                      <a:pPr algn="ctr" fontAlgn="ctr"/>
+                      <a:r>
+                        <a:rPr lang="en-US" sz="1000" b="0" i="0" u="none" strike="noStrike" dirty="0">
+                          <a:solidFill>
+                            <a:srgbClr val="000000"/>
+                          </a:solidFill>
+                          <a:effectLst/>
+                          <a:latin typeface="Segoe UI Black" panose="020B0A02040204020203" pitchFamily="34" charset="0"/>
+                        </a:rPr>
+                        <a:t>Paid Reviewer</a:t>
+                      </a:r>
+                    </a:p>
+                  </a:txBody>
+                  <a:tcPr marL="8912" marR="8912" marT="8912" marB="0" anchor="ctr">
+                    <a:lnL>
+                      <a:noFill/>
+                    </a:lnL>
+                    <a:lnR>
+                      <a:noFill/>
+                    </a:lnR>
+                    <a:lnT>
+                      <a:noFill/>
+                    </a:lnT>
+                    <a:lnB w="6350" cap="flat" cmpd="sng" algn="ctr">
+                      <a:solidFill>
+                        <a:srgbClr val="000000"/>
+                      </a:solidFill>
+                      <a:prstDash val="solid"/>
+                      <a:round/>
+                      <a:headEnd type="none" w="med" len="med"/>
+                      <a:tailEnd type="none" w="med" len="med"/>
+                    </a:lnB>
+                  </a:tcPr>
+                </a:tc>
+                <a:tc>
+                  <a:txBody>
+                    <a:bodyPr/>
+                    <a:lstStyle/>
+                    <a:p>
+                      <a:pPr algn="ctr" fontAlgn="ctr"/>
+                      <a:r>
+                        <a:rPr lang="en-US" sz="1000" b="0" i="0" u="none" strike="noStrike" dirty="0">
+                          <a:solidFill>
+                            <a:srgbClr val="000000"/>
+                          </a:solidFill>
+                          <a:effectLst/>
+                          <a:latin typeface="Segoe UI Black" panose="020B0A02040204020203" pitchFamily="34" charset="0"/>
+                        </a:rPr>
+                        <a:t>Real Reviewer</a:t>
+                      </a:r>
+                    </a:p>
+                  </a:txBody>
+                  <a:tcPr marL="8912" marR="8912" marT="8912" marB="0" anchor="ctr">
+                    <a:lnL>
+                      <a:noFill/>
+                    </a:lnL>
+                    <a:lnR>
+                      <a:noFill/>
+                    </a:lnR>
+                    <a:lnT>
+                      <a:noFill/>
+                    </a:lnT>
+                    <a:lnB w="6350" cap="flat" cmpd="sng" algn="ctr">
+                      <a:solidFill>
+                        <a:srgbClr val="000000"/>
+                      </a:solidFill>
+                      <a:prstDash val="solid"/>
+                      <a:round/>
+                      <a:headEnd type="none" w="med" len="med"/>
+                      <a:tailEnd type="none" w="med" len="med"/>
+                    </a:lnB>
+                  </a:tcPr>
+                </a:tc>
+                <a:extLst>
+                  <a:ext uri="{0D108BD9-81ED-4DB2-BD59-A6C34878D82A}">
+                    <a16:rowId xmlns:a16="http://schemas.microsoft.com/office/drawing/2014/main" val="3690279174"/>
+                  </a:ext>
+                </a:extLst>
+              </a:tr>
+              <a:tr h="793126">
+                <a:tc>
+                  <a:txBody>
+                    <a:bodyPr/>
+                    <a:lstStyle/>
+                    <a:p>
+                      <a:pPr algn="ctr" fontAlgn="ctr"/>
+                      <a:r>
+                        <a:rPr lang="en-US" sz="1000" b="0" i="0" u="none" strike="noStrike">
+                          <a:solidFill>
+                            <a:srgbClr val="000000"/>
+                          </a:solidFill>
+                          <a:effectLst/>
+                          <a:latin typeface="Segoe UI Black" panose="020B0A02040204020203" pitchFamily="34" charset="0"/>
+                        </a:rPr>
+                        <a:t>Positive</a:t>
+                      </a:r>
+                    </a:p>
+                  </a:txBody>
+                  <a:tcPr marL="8912" marR="8912" marT="8912" marB="0" anchor="ctr">
+                    <a:lnL>
+                      <a:noFill/>
+                    </a:lnL>
+                    <a:lnR w="6350" cap="flat" cmpd="sng" algn="ctr">
+                      <a:solidFill>
+                        <a:srgbClr val="000000"/>
+                      </a:solidFill>
+                      <a:prstDash val="solid"/>
+                      <a:round/>
+                      <a:headEnd type="none" w="med" len="med"/>
+                      <a:tailEnd type="none" w="med" len="med"/>
+                    </a:lnR>
+                    <a:lnT>
+                      <a:noFill/>
+                    </a:lnT>
+                    <a:lnB>
+                      <a:noFill/>
+                    </a:lnB>
+                  </a:tcPr>
+                </a:tc>
+                <a:tc>
+                  <a:txBody>
+                    <a:bodyPr/>
+                    <a:lstStyle/>
+                    <a:p>
+                      <a:pPr algn="ctr" fontAlgn="ctr"/>
+                      <a:r>
+                        <a:rPr lang="en-US" sz="1000" b="0" i="0" u="none" strike="noStrike">
+                          <a:solidFill>
+                            <a:srgbClr val="000000"/>
+                          </a:solidFill>
+                          <a:effectLst/>
+                          <a:latin typeface="Segoe UI Light" panose="020B0502040204020203" pitchFamily="34" charset="0"/>
+                        </a:rPr>
+                        <a:t>the experince at the hard rock hotel in chicago was fantastic,i will rate them a 6 out of 5. they have wonderful service and great staff and the view is just wonderful.</a:t>
+                      </a:r>
+                    </a:p>
+                  </a:txBody>
+                  <a:tcPr marL="8912" marR="8912" marT="8912" marB="0" anchor="ctr">
+                    <a:lnL w="6350" cap="flat" cmpd="sng" algn="ctr">
+                      <a:solidFill>
+                        <a:srgbClr val="000000"/>
+                      </a:solidFill>
+                      <a:prstDash val="solid"/>
+                      <a:round/>
+                      <a:headEnd type="none" w="med" len="med"/>
+                      <a:tailEnd type="none" w="med" len="med"/>
+                    </a:lnL>
+                    <a:lnR w="6350" cap="flat" cmpd="sng" algn="ctr">
+                      <a:solidFill>
+                        <a:srgbClr val="000000"/>
+                      </a:solidFill>
+                      <a:prstDash val="solid"/>
+                      <a:round/>
+                      <a:headEnd type="none" w="med" len="med"/>
+                      <a:tailEnd type="none" w="med" len="med"/>
+                    </a:lnR>
+                    <a:lnT w="6350" cap="flat" cmpd="sng" algn="ctr">
+                      <a:solidFill>
+                        <a:srgbClr val="000000"/>
+                      </a:solidFill>
+                      <a:prstDash val="solid"/>
+                      <a:round/>
+                      <a:headEnd type="none" w="med" len="med"/>
+                      <a:tailEnd type="none" w="med" len="med"/>
+                    </a:lnT>
+                    <a:lnB w="6350" cap="flat" cmpd="sng" algn="ctr">
+                      <a:solidFill>
+                        <a:srgbClr val="000000"/>
+                      </a:solidFill>
+                      <a:prstDash val="solid"/>
+                      <a:round/>
+                      <a:headEnd type="none" w="med" len="med"/>
+                      <a:tailEnd type="none" w="med" len="med"/>
+                    </a:lnB>
+                  </a:tcPr>
+                </a:tc>
+                <a:tc>
+                  <a:txBody>
+                    <a:bodyPr/>
+                    <a:lstStyle/>
+                    <a:p>
+                      <a:pPr algn="ctr" fontAlgn="ctr"/>
+                      <a:r>
+                        <a:rPr lang="en-US" sz="1000" b="0" i="0" u="none" strike="noStrike">
+                          <a:solidFill>
+                            <a:srgbClr val="000000"/>
+                          </a:solidFill>
+                          <a:effectLst/>
+                          <a:latin typeface="Segoe UI Light" panose="020B0502040204020203" pitchFamily="34" charset="0"/>
+                        </a:rPr>
+                        <a:t>I recently stayed at the Hard Rock Hotel in Chicago, Il. From the start, the experience was bad. The room was filthy, there were no towels, and the front desk did nothing to rectify the situation. I will never stay there again. I could not have been more dissatisfied.</a:t>
+                      </a:r>
+                    </a:p>
+                  </a:txBody>
+                  <a:tcPr marL="8912" marR="8912" marT="8912" marB="0" anchor="ctr">
+                    <a:lnL w="6350" cap="flat" cmpd="sng" algn="ctr">
+                      <a:solidFill>
+                        <a:srgbClr val="000000"/>
+                      </a:solidFill>
+                      <a:prstDash val="solid"/>
+                      <a:round/>
+                      <a:headEnd type="none" w="med" len="med"/>
+                      <a:tailEnd type="none" w="med" len="med"/>
+                    </a:lnL>
+                    <a:lnR w="6350" cap="flat" cmpd="sng" algn="ctr">
+                      <a:solidFill>
+                        <a:srgbClr val="000000"/>
+                      </a:solidFill>
+                      <a:prstDash val="solid"/>
+                      <a:round/>
+                      <a:headEnd type="none" w="med" len="med"/>
+                      <a:tailEnd type="none" w="med" len="med"/>
+                    </a:lnR>
+                    <a:lnT w="6350" cap="flat" cmpd="sng" algn="ctr">
+                      <a:solidFill>
+                        <a:srgbClr val="000000"/>
+                      </a:solidFill>
+                      <a:prstDash val="solid"/>
+                      <a:round/>
+                      <a:headEnd type="none" w="med" len="med"/>
+                      <a:tailEnd type="none" w="med" len="med"/>
+                    </a:lnT>
+                    <a:lnB w="6350" cap="flat" cmpd="sng" algn="ctr">
+                      <a:solidFill>
+                        <a:srgbClr val="000000"/>
+                      </a:solidFill>
+                      <a:prstDash val="solid"/>
+                      <a:round/>
+                      <a:headEnd type="none" w="med" len="med"/>
+                      <a:tailEnd type="none" w="med" len="med"/>
+                    </a:lnB>
+                  </a:tcPr>
+                </a:tc>
+                <a:extLst>
+                  <a:ext uri="{0D108BD9-81ED-4DB2-BD59-A6C34878D82A}">
+                    <a16:rowId xmlns:a16="http://schemas.microsoft.com/office/drawing/2014/main" val="366968680"/>
+                  </a:ext>
+                </a:extLst>
+              </a:tr>
+              <a:tr h="1960536">
+                <a:tc>
+                  <a:txBody>
+                    <a:bodyPr/>
+                    <a:lstStyle/>
+                    <a:p>
+                      <a:pPr algn="ctr" fontAlgn="ctr"/>
+                      <a:r>
+                        <a:rPr lang="en-US" sz="1000" b="0" i="0" u="none" strike="noStrike">
+                          <a:solidFill>
+                            <a:srgbClr val="000000"/>
+                          </a:solidFill>
+                          <a:effectLst/>
+                          <a:latin typeface="Segoe UI Black" panose="020B0A02040204020203" pitchFamily="34" charset="0"/>
+                        </a:rPr>
+                        <a:t>Negative</a:t>
+                      </a:r>
+                    </a:p>
+                  </a:txBody>
+                  <a:tcPr marL="8912" marR="8912" marT="8912" marB="0" anchor="ctr">
+                    <a:lnL>
+                      <a:noFill/>
+                    </a:lnL>
+                    <a:lnR w="6350" cap="flat" cmpd="sng" algn="ctr">
+                      <a:solidFill>
+                        <a:srgbClr val="000000"/>
+                      </a:solidFill>
+                      <a:prstDash val="solid"/>
+                      <a:round/>
+                      <a:headEnd type="none" w="med" len="med"/>
+                      <a:tailEnd type="none" w="med" len="med"/>
+                    </a:lnR>
+                    <a:lnT>
+                      <a:noFill/>
+                    </a:lnT>
+                    <a:lnB>
+                      <a:noFill/>
+                    </a:lnB>
+                  </a:tcPr>
+                </a:tc>
+                <a:tc>
+                  <a:txBody>
+                    <a:bodyPr/>
+                    <a:lstStyle/>
+                    <a:p>
+                      <a:pPr algn="ctr" fontAlgn="ctr"/>
+                      <a:r>
+                        <a:rPr lang="en-US" sz="1000" b="0" i="0" u="none" strike="noStrike">
+                          <a:solidFill>
+                            <a:srgbClr val="000000"/>
+                          </a:solidFill>
+                          <a:effectLst/>
+                          <a:latin typeface="Segoe UI Light" panose="020B0502040204020203" pitchFamily="34" charset="0"/>
+                        </a:rPr>
+                        <a:t>The Swissotel Chicago is a very mediocre hotel, the service is always poor, and the room service food always comes cold, unless it's supposed to be cold than it comes warm. I would rather stay at a super 8 than this place again.</a:t>
+                      </a:r>
+                    </a:p>
+                  </a:txBody>
+                  <a:tcPr marL="8912" marR="8912" marT="8912" marB="0" anchor="ctr">
+                    <a:lnL w="6350" cap="flat" cmpd="sng" algn="ctr">
+                      <a:solidFill>
+                        <a:srgbClr val="000000"/>
+                      </a:solidFill>
+                      <a:prstDash val="solid"/>
+                      <a:round/>
+                      <a:headEnd type="none" w="med" len="med"/>
+                      <a:tailEnd type="none" w="med" len="med"/>
+                    </a:lnL>
+                    <a:lnR w="6350" cap="flat" cmpd="sng" algn="ctr">
+                      <a:solidFill>
+                        <a:srgbClr val="000000"/>
+                      </a:solidFill>
+                      <a:prstDash val="solid"/>
+                      <a:round/>
+                      <a:headEnd type="none" w="med" len="med"/>
+                      <a:tailEnd type="none" w="med" len="med"/>
+                    </a:lnR>
+                    <a:lnT w="6350" cap="flat" cmpd="sng" algn="ctr">
+                      <a:solidFill>
+                        <a:srgbClr val="000000"/>
+                      </a:solidFill>
+                      <a:prstDash val="solid"/>
+                      <a:round/>
+                      <a:headEnd type="none" w="med" len="med"/>
+                      <a:tailEnd type="none" w="med" len="med"/>
+                    </a:lnT>
+                    <a:lnB w="6350" cap="flat" cmpd="sng" algn="ctr">
+                      <a:solidFill>
+                        <a:srgbClr val="000000"/>
+                      </a:solidFill>
+                      <a:prstDash val="solid"/>
+                      <a:round/>
+                      <a:headEnd type="none" w="med" len="med"/>
+                      <a:tailEnd type="none" w="med" len="med"/>
+                    </a:lnB>
+                  </a:tcPr>
+                </a:tc>
+                <a:tc>
+                  <a:txBody>
+                    <a:bodyPr/>
+                    <a:lstStyle/>
+                    <a:p>
+                      <a:pPr algn="ctr" fontAlgn="ctr"/>
+                      <a:r>
+                        <a:rPr lang="en-US" sz="1000" b="0" i="0" u="none" strike="noStrike" dirty="0">
+                          <a:solidFill>
+                            <a:srgbClr val="000000"/>
+                          </a:solidFill>
+                          <a:effectLst/>
+                          <a:latin typeface="Segoe UI Light" panose="020B0502040204020203" pitchFamily="34" charset="0"/>
+                        </a:rPr>
+                        <a:t>I travel often for business and this hotel ranks very low on my list. The room had such a strong odor of smoke, it gave me a headache (and I used to be a smoker)! The room service was mediocre and extremely expensive. The hotel is disturbingly huge. Very difficult to navigate your way around it. I waited on hold for twenty minutes to ask a concierge where a pharmacy was located. She curtly gave me cross-street names and hung up. </a:t>
+                      </a:r>
+                      <a:r>
+                        <a:rPr lang="en-US" sz="1000" b="0" i="0" u="none" strike="noStrike" dirty="0" err="1">
+                          <a:solidFill>
+                            <a:srgbClr val="000000"/>
+                          </a:solidFill>
+                          <a:effectLst/>
+                          <a:latin typeface="Segoe UI Light" panose="020B0502040204020203" pitchFamily="34" charset="0"/>
+                        </a:rPr>
+                        <a:t>Uhhhhh</a:t>
+                      </a:r>
+                      <a:r>
+                        <a:rPr lang="en-US" sz="1000" b="0" i="0" u="none" strike="noStrike" dirty="0">
+                          <a:solidFill>
+                            <a:srgbClr val="000000"/>
+                          </a:solidFill>
+                          <a:effectLst/>
+                          <a:latin typeface="Segoe UI Light" panose="020B0502040204020203" pitchFamily="34" charset="0"/>
+                        </a:rPr>
+                        <a:t>, how do I know which direction to go in??? Stains on the carpet in the room. A big gauge in the wall, where maybe a thermostat once was??? The shower is decent. All in all, for the price they charge, NO THANKS!!! I'm just glad my company is footing the bill.</a:t>
+                      </a:r>
+                      <a:br>
+                        <a:rPr lang="en-US" sz="1000" b="0" i="0" u="none" strike="noStrike" dirty="0">
+                          <a:solidFill>
+                            <a:srgbClr val="000000"/>
+                          </a:solidFill>
+                          <a:effectLst/>
+                          <a:latin typeface="Segoe UI Light" panose="020B0502040204020203" pitchFamily="34" charset="0"/>
+                        </a:rPr>
+                      </a:br>
+                      <a:endParaRPr lang="en-US" sz="1000" b="0" i="0" u="none" strike="noStrike" dirty="0">
+                        <a:solidFill>
+                          <a:srgbClr val="000000"/>
+                        </a:solidFill>
+                        <a:effectLst/>
+                        <a:latin typeface="Segoe UI Light" panose="020B0502040204020203" pitchFamily="34" charset="0"/>
+                      </a:endParaRPr>
+                    </a:p>
+                  </a:txBody>
+                  <a:tcPr marL="8912" marR="8912" marT="8912" marB="0" anchor="ctr">
+                    <a:lnL w="6350" cap="flat" cmpd="sng" algn="ctr">
+                      <a:solidFill>
+                        <a:srgbClr val="000000"/>
+                      </a:solidFill>
+                      <a:prstDash val="solid"/>
+                      <a:round/>
+                      <a:headEnd type="none" w="med" len="med"/>
+                      <a:tailEnd type="none" w="med" len="med"/>
+                    </a:lnL>
+                    <a:lnR w="6350" cap="flat" cmpd="sng" algn="ctr">
+                      <a:solidFill>
+                        <a:srgbClr val="000000"/>
+                      </a:solidFill>
+                      <a:prstDash val="solid"/>
+                      <a:round/>
+                      <a:headEnd type="none" w="med" len="med"/>
+                      <a:tailEnd type="none" w="med" len="med"/>
+                    </a:lnR>
+                    <a:lnT w="6350" cap="flat" cmpd="sng" algn="ctr">
+                      <a:solidFill>
+                        <a:srgbClr val="000000"/>
+                      </a:solidFill>
+                      <a:prstDash val="solid"/>
+                      <a:round/>
+                      <a:headEnd type="none" w="med" len="med"/>
+                      <a:tailEnd type="none" w="med" len="med"/>
+                    </a:lnT>
+                    <a:lnB w="6350" cap="flat" cmpd="sng" algn="ctr">
+                      <a:solidFill>
+                        <a:srgbClr val="000000"/>
+                      </a:solidFill>
+                      <a:prstDash val="solid"/>
+                      <a:round/>
+                      <a:headEnd type="none" w="med" len="med"/>
+                      <a:tailEnd type="none" w="med" len="med"/>
+                    </a:lnB>
+                  </a:tcPr>
+                </a:tc>
+                <a:extLst>
+                  <a:ext uri="{0D108BD9-81ED-4DB2-BD59-A6C34878D82A}">
+                    <a16:rowId xmlns:a16="http://schemas.microsoft.com/office/drawing/2014/main" val="3943211452"/>
+                  </a:ext>
+                </a:extLst>
+              </a:tr>
+            </a:tbl>
+          </a:graphicData>
+        </a:graphic>
+      </p:graphicFrame>
+      <p:sp>
+        <p:nvSpPr>
+          <p:cNvPr id="13" name="Title 1">
+            <a:extLst>
+              <a:ext uri="{FF2B5EF4-FFF2-40B4-BE49-F238E27FC236}">
+                <a16:creationId xmlns:a16="http://schemas.microsoft.com/office/drawing/2014/main" id="{D4E6D5B8-B873-43DC-94B7-AD594C0A0860}"/>
+              </a:ext>
+            </a:extLst>
+          </p:cNvPr>
           <p:cNvSpPr>
             <a:spLocks noGrp="1"/>
           </p:cNvSpPr>
@@ -6015,149 +6359,33 @@
             <p:ph type="title"/>
           </p:nvPr>
         </p:nvSpPr>
-        <p:spPr/>
-        <p:txBody>
-          <a:bodyPr/>
-          <a:lstStyle/>
-          <a:p>
-            <a:r>
-              <a:rPr lang="en-US" dirty="0">
+        <p:spPr>
+          <a:xfrm>
+            <a:off x="838200" y="365125"/>
+            <a:ext cx="10515600" cy="1325563"/>
+          </a:xfrm>
+        </p:spPr>
+        <p:txBody>
+          <a:bodyPr>
+            <a:normAutofit/>
+          </a:bodyPr>
+          <a:lstStyle/>
+          <a:p>
+            <a:r>
+              <a:rPr lang="en-US" sz="4000" dirty="0">
                 <a:latin typeface="Segoe UI Black" panose="020B0A02040204020203" pitchFamily="34" charset="0"/>
                 <a:ea typeface="Segoe UI Black" panose="020B0A02040204020203" pitchFamily="34" charset="0"/>
                 <a:cs typeface="Segoe UI Black" panose="020B0A02040204020203" pitchFamily="34" charset="0"/>
               </a:rPr>
-              <a:t>Data (1) Overview</a:t>
-            </a:r>
-          </a:p>
-        </p:txBody>
-      </p:sp>
-      <p:sp>
-        <p:nvSpPr>
-          <p:cNvPr id="3" name="Content Placeholder 2"/>
-          <p:cNvSpPr>
-            <a:spLocks noGrp="1"/>
-          </p:cNvSpPr>
-          <p:nvPr>
-            <p:ph idx="1"/>
-          </p:nvPr>
-        </p:nvSpPr>
-        <p:spPr>
-          <a:xfrm>
-            <a:off x="838199" y="1825625"/>
-            <a:ext cx="10671495" cy="4351338"/>
-          </a:xfrm>
-        </p:spPr>
-        <p:txBody>
-          <a:bodyPr>
-            <a:normAutofit/>
-          </a:bodyPr>
-          <a:lstStyle/>
-          <a:p>
-            <a:pPr marL="0" indent="0">
-              <a:buNone/>
-            </a:pPr>
-            <a:r>
-              <a:rPr lang="en-US" dirty="0">
-                <a:latin typeface="Segoe UI Light" panose="020B0502040204020203" pitchFamily="34" charset="0"/>
-                <a:cs typeface="Segoe UI Light" panose="020B0502040204020203" pitchFamily="34" charset="0"/>
-              </a:rPr>
-              <a:t>Source: </a:t>
-            </a:r>
-            <a:r>
-              <a:rPr lang="en-US" dirty="0">
-                <a:latin typeface="Segoe UI Light" panose="020B0502040204020203" pitchFamily="34" charset="0"/>
-                <a:cs typeface="Segoe UI Light" panose="020B0502040204020203" pitchFamily="34" charset="0"/>
-                <a:hlinkClick r:id="rId2"/>
-              </a:rPr>
-              <a:t>Kaggle, “Deceptive Hotel Opinions Corpus”</a:t>
-            </a:r>
-            <a:endParaRPr lang="en-US" dirty="0">
-              <a:latin typeface="Segoe UI Light" panose="020B0502040204020203" pitchFamily="34" charset="0"/>
-              <a:cs typeface="Segoe UI Light" panose="020B0502040204020203" pitchFamily="34" charset="0"/>
-            </a:endParaRPr>
-          </a:p>
-          <a:p>
-            <a:r>
-              <a:rPr lang="en-US" dirty="0">
-                <a:latin typeface="Segoe UI Light" panose="020B0502040204020203" pitchFamily="34" charset="0"/>
-                <a:cs typeface="Segoe UI Light" panose="020B0502040204020203" pitchFamily="34" charset="0"/>
-              </a:rPr>
-              <a:t>1600 records</a:t>
-            </a:r>
-          </a:p>
-          <a:p>
-            <a:pPr lvl="1"/>
-            <a:r>
-              <a:rPr lang="en-US" dirty="0">
-                <a:latin typeface="Segoe UI Light" panose="020B0502040204020203" pitchFamily="34" charset="0"/>
-                <a:cs typeface="Segoe UI Light" panose="020B0502040204020203" pitchFamily="34" charset="0"/>
-              </a:rPr>
-              <a:t>800 Deceptive</a:t>
-            </a:r>
-          </a:p>
-          <a:p>
-            <a:pPr lvl="2"/>
-            <a:r>
-              <a:rPr lang="en-US" sz="1600" dirty="0">
-                <a:latin typeface="Segoe UI Light" panose="020B0502040204020203" pitchFamily="34" charset="0"/>
-                <a:cs typeface="Segoe UI Light" panose="020B0502040204020203" pitchFamily="34" charset="0"/>
-              </a:rPr>
-              <a:t>Generated by Mechanical Turks: Crowdsourced, human intelligence tasking</a:t>
-            </a:r>
-          </a:p>
-          <a:p>
-            <a:pPr lvl="1"/>
-            <a:r>
-              <a:rPr lang="en-US" dirty="0">
-                <a:latin typeface="Segoe UI Light" panose="020B0502040204020203" pitchFamily="34" charset="0"/>
-                <a:cs typeface="Segoe UI Light" panose="020B0502040204020203" pitchFamily="34" charset="0"/>
-              </a:rPr>
-              <a:t>800 Genuine</a:t>
-            </a:r>
-          </a:p>
-          <a:p>
-            <a:pPr lvl="2"/>
-            <a:r>
-              <a:rPr lang="en-US" dirty="0">
-                <a:latin typeface="Segoe UI Light" panose="020B0502040204020203" pitchFamily="34" charset="0"/>
-                <a:cs typeface="Segoe UI Light" panose="020B0502040204020203" pitchFamily="34" charset="0"/>
-              </a:rPr>
-              <a:t>Multiple Review Aggregator sites</a:t>
-            </a:r>
-          </a:p>
-          <a:p>
-            <a:pPr lvl="2"/>
-            <a:r>
-              <a:rPr lang="en-US" dirty="0">
-                <a:latin typeface="Segoe UI Light" panose="020B0502040204020203" pitchFamily="34" charset="0"/>
-                <a:cs typeface="Segoe UI Light" panose="020B0502040204020203" pitchFamily="34" charset="0"/>
-              </a:rPr>
-              <a:t>Web</a:t>
-            </a:r>
-          </a:p>
-          <a:p>
-            <a:pPr lvl="1"/>
-            <a:r>
-              <a:rPr lang="en-US" dirty="0">
-                <a:latin typeface="Segoe UI Light" panose="020B0502040204020203" pitchFamily="34" charset="0"/>
-                <a:cs typeface="Segoe UI Light" panose="020B0502040204020203" pitchFamily="34" charset="0"/>
-              </a:rPr>
-              <a:t>Positive and Negative Sentiment</a:t>
-            </a:r>
-          </a:p>
-          <a:p>
-            <a:pPr lvl="1"/>
-            <a:endParaRPr lang="en-US" dirty="0">
-              <a:latin typeface="Segoe UI Light" panose="020B0502040204020203" pitchFamily="34" charset="0"/>
-              <a:cs typeface="Segoe UI Light" panose="020B0502040204020203" pitchFamily="34" charset="0"/>
-            </a:endParaRPr>
+              <a:t>Data (1) Can you tell the difference?</a:t>
+            </a:r>
           </a:p>
         </p:txBody>
       </p:sp>
     </p:spTree>
     <p:extLst>
       <p:ext uri="{BB962C8B-B14F-4D97-AF65-F5344CB8AC3E}">
-        <p14:creationId xmlns:p14="http://schemas.microsoft.com/office/powerpoint/2010/main" val="3486041349"/>
+        <p14:creationId xmlns:p14="http://schemas.microsoft.com/office/powerpoint/2010/main" val="3706997458"/>
       </p:ext>
     </p:extLst>
   </p:cSld>

</xml_diff>

<commit_message>
Re-Ran + Updated PDF
</commit_message>
<xml_diff>
--- a/NLP 2 - Hotel Reviews Deliverable.pptx
+++ b/NLP 2 - Hotel Reviews Deliverable.pptx
@@ -20,7 +20,12 @@
     <p:sldId id="261" r:id="rId14"/>
     <p:sldId id="263" r:id="rId15"/>
     <p:sldId id="270" r:id="rId16"/>
-    <p:sldId id="269" r:id="rId17"/>
+    <p:sldId id="277" r:id="rId17"/>
+    <p:sldId id="278" r:id="rId18"/>
+    <p:sldId id="279" r:id="rId19"/>
+    <p:sldId id="280" r:id="rId20"/>
+    <p:sldId id="281" r:id="rId21"/>
+    <p:sldId id="269" r:id="rId22"/>
   </p:sldIdLst>
   <p:sldSz cx="12192000" cy="6858000"/>
   <p:notesSz cx="6858000" cy="9144000"/>
@@ -4305,7 +4310,7 @@
         <p:spPr/>
         <p:txBody>
           <a:bodyPr>
-            <a:normAutofit fontScale="92500" lnSpcReduction="10000"/>
+            <a:normAutofit fontScale="92500" lnSpcReduction="20000"/>
           </a:bodyPr>
           <a:lstStyle/>
           <a:p>
@@ -4334,7 +4339,7 @@
                 <a:latin typeface="Segoe UI Light" panose="020B0502040204020203" pitchFamily="34" charset="0"/>
                 <a:cs typeface="Segoe UI Light" panose="020B0502040204020203" pitchFamily="34" charset="0"/>
               </a:rPr>
-              <a:t>Linear Discriminant Analysis</a:t>
+              <a:t>Linear Discriminant Analysis (LDA)</a:t>
             </a:r>
           </a:p>
           <a:p>
@@ -4364,7 +4369,7 @@
                 <a:latin typeface="Segoe UI Light" panose="020B0502040204020203" pitchFamily="34" charset="0"/>
                 <a:cs typeface="Segoe UI Light" panose="020B0502040204020203" pitchFamily="34" charset="0"/>
               </a:rPr>
-              <a:t>Naive Bayes</a:t>
+              <a:t>Naive Bayes (NB)</a:t>
             </a:r>
           </a:p>
           <a:p>
@@ -4374,7 +4379,17 @@
                 <a:latin typeface="Segoe UI Light" panose="020B0502040204020203" pitchFamily="34" charset="0"/>
                 <a:cs typeface="Segoe UI Light" panose="020B0502040204020203" pitchFamily="34" charset="0"/>
               </a:rPr>
-              <a:t>Support Vector Classifier</a:t>
+              <a:t>Support Vector Classifier (SVM)</a:t>
+            </a:r>
+          </a:p>
+          <a:p>
+            <a:pPr lvl="1"/>
+            <a:r>
+              <a:rPr lang="en-US" dirty="0">
+                <a:latin typeface="Segoe UI Light" panose="020B0502040204020203" pitchFamily="34" charset="0"/>
+                <a:cs typeface="Segoe UI Light" panose="020B0502040204020203" pitchFamily="34" charset="0"/>
+              </a:rPr>
+              <a:t>Random Forest (RF)</a:t>
             </a:r>
           </a:p>
           <a:p>
@@ -4462,169 +4477,9 @@
           <a:chExt cx="0" cy="0"/>
         </a:xfrm>
       </p:grpSpPr>
-      <p:sp>
-        <p:nvSpPr>
-          <p:cNvPr id="2" name="Title 1"/>
-          <p:cNvSpPr>
-            <a:spLocks noGrp="1"/>
-          </p:cNvSpPr>
-          <p:nvPr>
-            <p:ph type="title"/>
-          </p:nvPr>
-        </p:nvSpPr>
-        <p:spPr/>
-        <p:txBody>
-          <a:bodyPr/>
-          <a:lstStyle/>
-          <a:p>
-            <a:r>
-              <a:rPr lang="en-US" dirty="0">
-                <a:latin typeface="Segoe UI Black" panose="020B0A02040204020203" pitchFamily="34" charset="0"/>
-                <a:ea typeface="Segoe UI Black" panose="020B0A02040204020203" pitchFamily="34" charset="0"/>
-                <a:cs typeface="Segoe UI Black" panose="020B0A02040204020203" pitchFamily="34" charset="0"/>
-              </a:rPr>
-              <a:t>Results (1)</a:t>
-            </a:r>
-          </a:p>
-        </p:txBody>
-      </p:sp>
-      <p:sp>
-        <p:nvSpPr>
-          <p:cNvPr id="12" name="Rectangle 11"/>
-          <p:cNvSpPr/>
-          <p:nvPr/>
-        </p:nvSpPr>
-        <p:spPr>
-          <a:xfrm>
-            <a:off x="263313" y="1453301"/>
-            <a:ext cx="3660711" cy="400110"/>
-          </a:xfrm>
-          <a:prstGeom prst="rect">
-            <a:avLst/>
-          </a:prstGeom>
-        </p:spPr>
-        <p:txBody>
-          <a:bodyPr wrap="square">
-            <a:spAutoFit/>
-          </a:bodyPr>
-          <a:lstStyle/>
-          <a:p>
-            <a:pPr lvl="1" algn="ctr"/>
-            <a:r>
-              <a:rPr lang="en-US" sz="2000" dirty="0">
-                <a:latin typeface="Segoe UI Light" panose="020B0502040204020203" pitchFamily="34" charset="0"/>
-                <a:cs typeface="Segoe UI Light" panose="020B0502040204020203" pitchFamily="34" charset="0"/>
-              </a:rPr>
-              <a:t>Topics Only</a:t>
-            </a:r>
-          </a:p>
-        </p:txBody>
-      </p:sp>
-      <p:sp>
-        <p:nvSpPr>
-          <p:cNvPr id="13" name="Rectangle 12"/>
-          <p:cNvSpPr/>
-          <p:nvPr/>
-        </p:nvSpPr>
-        <p:spPr>
-          <a:xfrm>
-            <a:off x="4265644" y="1290023"/>
-            <a:ext cx="3660711" cy="707886"/>
-          </a:xfrm>
-          <a:prstGeom prst="rect">
-            <a:avLst/>
-          </a:prstGeom>
-        </p:spPr>
-        <p:txBody>
-          <a:bodyPr wrap="square">
-            <a:spAutoFit/>
-          </a:bodyPr>
-          <a:lstStyle/>
-          <a:p>
-            <a:pPr algn="ctr"/>
-            <a:r>
-              <a:rPr lang="en-US" sz="2000" dirty="0">
-                <a:latin typeface="Segoe UI Light" panose="020B0502040204020203" pitchFamily="34" charset="0"/>
-                <a:cs typeface="Segoe UI Light" panose="020B0502040204020203" pitchFamily="34" charset="0"/>
-              </a:rPr>
-              <a:t>Previous + Parts of Speech Metrics</a:t>
-            </a:r>
-          </a:p>
-        </p:txBody>
-      </p:sp>
-      <p:sp>
-        <p:nvSpPr>
-          <p:cNvPr id="14" name="Rectangle 13"/>
-          <p:cNvSpPr/>
-          <p:nvPr/>
-        </p:nvSpPr>
-        <p:spPr>
-          <a:xfrm>
-            <a:off x="8340009" y="1451250"/>
-            <a:ext cx="3660711" cy="400110"/>
-          </a:xfrm>
-          <a:prstGeom prst="rect">
-            <a:avLst/>
-          </a:prstGeom>
-        </p:spPr>
-        <p:txBody>
-          <a:bodyPr wrap="square">
-            <a:spAutoFit/>
-          </a:bodyPr>
-          <a:lstStyle/>
-          <a:p>
-            <a:pPr algn="ctr"/>
-            <a:r>
-              <a:rPr lang="en-US" sz="2000" dirty="0">
-                <a:latin typeface="Segoe UI Light" panose="020B0502040204020203" pitchFamily="34" charset="0"/>
-                <a:cs typeface="Segoe UI Light" panose="020B0502040204020203" pitchFamily="34" charset="0"/>
-              </a:rPr>
-              <a:t>Previous + Dummy Variables</a:t>
-            </a:r>
-          </a:p>
-        </p:txBody>
-      </p:sp>
-      <p:sp>
-        <p:nvSpPr>
-          <p:cNvPr id="16" name="Rectangle 15"/>
-          <p:cNvSpPr/>
-          <p:nvPr/>
-        </p:nvSpPr>
-        <p:spPr>
-          <a:xfrm>
-            <a:off x="1504324" y="5955630"/>
-            <a:ext cx="2419701" cy="369332"/>
-          </a:xfrm>
-          <a:prstGeom prst="rect">
-            <a:avLst/>
-          </a:prstGeom>
-        </p:spPr>
-        <p:txBody>
-          <a:bodyPr wrap="none">
-            <a:spAutoFit/>
-          </a:bodyPr>
-          <a:lstStyle/>
-          <a:p>
-            <a:pPr algn="ctr"/>
-            <a:r>
-              <a:rPr lang="en-US" dirty="0">
-                <a:latin typeface="Segoe UI Light" panose="020B0502040204020203" pitchFamily="34" charset="0"/>
-                <a:cs typeface="Segoe UI Light" panose="020B0502040204020203" pitchFamily="34" charset="0"/>
-              </a:rPr>
-              <a:t>LDA performs the best.</a:t>
-            </a:r>
-          </a:p>
-        </p:txBody>
-      </p:sp>
       <p:pic>
         <p:nvPicPr>
-          <p:cNvPr id="3" name="Picture 2">
-            <a:extLst>
-              <a:ext uri="{FF2B5EF4-FFF2-40B4-BE49-F238E27FC236}">
-                <a16:creationId xmlns:a16="http://schemas.microsoft.com/office/drawing/2014/main" id="{A2A7E087-068A-4DD3-8659-1D4160FB4BD2}"/>
-              </a:ext>
-            </a:extLst>
-          </p:cNvPr>
+          <p:cNvPr id="10" name="Picture 9"/>
           <p:cNvPicPr>
             <a:picLocks noChangeAspect="1"/>
           </p:cNvPicPr>
@@ -4638,8 +4493,8 @@
         </p:blipFill>
         <p:spPr>
           <a:xfrm>
-            <a:off x="953348" y="2154172"/>
-            <a:ext cx="3464750" cy="3738939"/>
+            <a:off x="4632040" y="2007240"/>
+            <a:ext cx="3825215" cy="4088709"/>
           </a:xfrm>
           <a:prstGeom prst="rect">
             <a:avLst/>
@@ -4648,13 +4503,7 @@
       </p:pic>
       <p:pic>
         <p:nvPicPr>
-          <p:cNvPr id="7" name="Picture 6">
-            <a:extLst>
-              <a:ext uri="{FF2B5EF4-FFF2-40B4-BE49-F238E27FC236}">
-                <a16:creationId xmlns:a16="http://schemas.microsoft.com/office/drawing/2014/main" id="{C8729CC7-5648-45B3-AEA3-5AD68FC8CCFB}"/>
-              </a:ext>
-            </a:extLst>
-          </p:cNvPr>
+          <p:cNvPr id="5" name="Picture 4"/>
           <p:cNvPicPr>
             <a:picLocks noChangeAspect="1"/>
           </p:cNvPicPr>
@@ -4668,8 +4517,8 @@
         </p:blipFill>
         <p:spPr>
           <a:xfrm>
-            <a:off x="4539652" y="2154172"/>
-            <a:ext cx="3489676" cy="3705704"/>
+            <a:off x="8340009" y="2015420"/>
+            <a:ext cx="3759825" cy="3956300"/>
           </a:xfrm>
           <a:prstGeom prst="rect">
             <a:avLst/>
@@ -4678,13 +4527,7 @@
       </p:pic>
       <p:pic>
         <p:nvPicPr>
-          <p:cNvPr id="9" name="Picture 8">
-            <a:extLst>
-              <a:ext uri="{FF2B5EF4-FFF2-40B4-BE49-F238E27FC236}">
-                <a16:creationId xmlns:a16="http://schemas.microsoft.com/office/drawing/2014/main" id="{BBF78E02-66DE-4787-B72A-7245C6A287F8}"/>
-              </a:ext>
-            </a:extLst>
-          </p:cNvPr>
+          <p:cNvPr id="8" name="Picture 7"/>
           <p:cNvPicPr>
             <a:picLocks noChangeAspect="1"/>
           </p:cNvPicPr>
@@ -4698,8 +4541,8 @@
         </p:blipFill>
         <p:spPr>
           <a:xfrm>
-            <a:off x="8488430" y="2228951"/>
-            <a:ext cx="3431515" cy="3664160"/>
+            <a:off x="949735" y="2031400"/>
+            <a:ext cx="3706241" cy="3965231"/>
           </a:xfrm>
           <a:prstGeom prst="rect">
             <a:avLst/>
@@ -4708,20 +4551,174 @@
       </p:pic>
       <p:sp>
         <p:nvSpPr>
+          <p:cNvPr id="2" name="Title 1"/>
+          <p:cNvSpPr>
+            <a:spLocks noGrp="1"/>
+          </p:cNvSpPr>
+          <p:nvPr>
+            <p:ph type="title"/>
+          </p:nvPr>
+        </p:nvSpPr>
+        <p:spPr/>
+        <p:txBody>
+          <a:bodyPr/>
+          <a:lstStyle/>
+          <a:p>
+            <a:r>
+              <a:rPr lang="en-US" dirty="0">
+                <a:latin typeface="Segoe UI Black" panose="020B0A02040204020203" pitchFamily="34" charset="0"/>
+                <a:ea typeface="Segoe UI Black" panose="020B0A02040204020203" pitchFamily="34" charset="0"/>
+                <a:cs typeface="Segoe UI Black" panose="020B0A02040204020203" pitchFamily="34" charset="0"/>
+              </a:rPr>
+              <a:t>Model Selection (1)</a:t>
+            </a:r>
+          </a:p>
+        </p:txBody>
+      </p:sp>
+      <p:sp>
+        <p:nvSpPr>
+          <p:cNvPr id="12" name="Rectangle 11"/>
+          <p:cNvSpPr/>
+          <p:nvPr/>
+        </p:nvSpPr>
+        <p:spPr>
+          <a:xfrm>
+            <a:off x="263313" y="1453301"/>
+            <a:ext cx="3660711" cy="400110"/>
+          </a:xfrm>
+          <a:prstGeom prst="rect">
+            <a:avLst/>
+          </a:prstGeom>
+        </p:spPr>
+        <p:txBody>
+          <a:bodyPr wrap="square">
+            <a:spAutoFit/>
+          </a:bodyPr>
+          <a:lstStyle/>
+          <a:p>
+            <a:pPr lvl="1" algn="ctr"/>
+            <a:r>
+              <a:rPr lang="en-US" sz="2000" dirty="0">
+                <a:latin typeface="Segoe UI Light" panose="020B0502040204020203" pitchFamily="34" charset="0"/>
+                <a:cs typeface="Segoe UI Light" panose="020B0502040204020203" pitchFamily="34" charset="0"/>
+              </a:rPr>
+              <a:t>Topics Only</a:t>
+            </a:r>
+          </a:p>
+        </p:txBody>
+      </p:sp>
+      <p:sp>
+        <p:nvSpPr>
+          <p:cNvPr id="13" name="Rectangle 12"/>
+          <p:cNvSpPr/>
+          <p:nvPr/>
+        </p:nvSpPr>
+        <p:spPr>
+          <a:xfrm>
+            <a:off x="4265644" y="1290023"/>
+            <a:ext cx="3660711" cy="707886"/>
+          </a:xfrm>
+          <a:prstGeom prst="rect">
+            <a:avLst/>
+          </a:prstGeom>
+        </p:spPr>
+        <p:txBody>
+          <a:bodyPr wrap="square">
+            <a:spAutoFit/>
+          </a:bodyPr>
+          <a:lstStyle/>
+          <a:p>
+            <a:pPr algn="ctr"/>
+            <a:r>
+              <a:rPr lang="en-US" sz="2000" dirty="0">
+                <a:latin typeface="Segoe UI Light" panose="020B0502040204020203" pitchFamily="34" charset="0"/>
+                <a:cs typeface="Segoe UI Light" panose="020B0502040204020203" pitchFamily="34" charset="0"/>
+              </a:rPr>
+              <a:t>Previous + Parts of Speech Metrics</a:t>
+            </a:r>
+          </a:p>
+        </p:txBody>
+      </p:sp>
+      <p:sp>
+        <p:nvSpPr>
+          <p:cNvPr id="14" name="Rectangle 13"/>
+          <p:cNvSpPr/>
+          <p:nvPr/>
+        </p:nvSpPr>
+        <p:spPr>
+          <a:xfrm>
+            <a:off x="8340009" y="1451250"/>
+            <a:ext cx="3660711" cy="400110"/>
+          </a:xfrm>
+          <a:prstGeom prst="rect">
+            <a:avLst/>
+          </a:prstGeom>
+        </p:spPr>
+        <p:txBody>
+          <a:bodyPr wrap="square">
+            <a:spAutoFit/>
+          </a:bodyPr>
+          <a:lstStyle/>
+          <a:p>
+            <a:pPr algn="ctr"/>
+            <a:r>
+              <a:rPr lang="en-US" sz="2000" dirty="0">
+                <a:latin typeface="Segoe UI Light" panose="020B0502040204020203" pitchFamily="34" charset="0"/>
+                <a:cs typeface="Segoe UI Light" panose="020B0502040204020203" pitchFamily="34" charset="0"/>
+              </a:rPr>
+              <a:t>Previous + Dummy Variables</a:t>
+            </a:r>
+          </a:p>
+        </p:txBody>
+      </p:sp>
+      <p:sp>
+        <p:nvSpPr>
+          <p:cNvPr id="16" name="Rectangle 15"/>
+          <p:cNvSpPr/>
+          <p:nvPr/>
+        </p:nvSpPr>
+        <p:spPr>
+          <a:xfrm>
+            <a:off x="1504324" y="5955630"/>
+            <a:ext cx="2419701" cy="369332"/>
+          </a:xfrm>
+          <a:prstGeom prst="rect">
+            <a:avLst/>
+          </a:prstGeom>
+        </p:spPr>
+        <p:txBody>
+          <a:bodyPr wrap="none">
+            <a:spAutoFit/>
+          </a:bodyPr>
+          <a:lstStyle/>
+          <a:p>
+            <a:pPr algn="ctr"/>
+            <a:r>
+              <a:rPr lang="en-US" dirty="0">
+                <a:latin typeface="Segoe UI Light" panose="020B0502040204020203" pitchFamily="34" charset="0"/>
+                <a:cs typeface="Segoe UI Light" panose="020B0502040204020203" pitchFamily="34" charset="0"/>
+              </a:rPr>
+              <a:t>LDA performs the best.</a:t>
+            </a:r>
+          </a:p>
+        </p:txBody>
+      </p:sp>
+      <p:sp>
+        <p:nvSpPr>
           <p:cNvPr id="11" name="Rectangle 10"/>
           <p:cNvSpPr/>
           <p:nvPr/>
         </p:nvSpPr>
         <p:spPr>
           <a:xfrm>
-            <a:off x="929389" y="2325959"/>
+            <a:off x="949735" y="2192072"/>
             <a:ext cx="9976598" cy="163380"/>
           </a:xfrm>
           <a:prstGeom prst="rect">
             <a:avLst/>
           </a:prstGeom>
           <a:noFill/>
-          <a:ln w="19050">
+          <a:ln w="3175">
             <a:solidFill>
               <a:schemeClr val="tx1"/>
             </a:solidFill>
@@ -4785,13 +4782,7 @@
       </p:grpSpPr>
       <p:pic>
         <p:nvPicPr>
-          <p:cNvPr id="10" name="Picture 9">
-            <a:extLst>
-              <a:ext uri="{FF2B5EF4-FFF2-40B4-BE49-F238E27FC236}">
-                <a16:creationId xmlns:a16="http://schemas.microsoft.com/office/drawing/2014/main" id="{9FF4A0CF-323E-4790-ACFE-C5B53B004394}"/>
-              </a:ext>
-            </a:extLst>
-          </p:cNvPr>
+          <p:cNvPr id="8" name="Picture 7"/>
           <p:cNvPicPr>
             <a:picLocks noChangeAspect="1"/>
           </p:cNvPicPr>
@@ -4805,8 +4796,8 @@
         </p:blipFill>
         <p:spPr>
           <a:xfrm>
-            <a:off x="624333" y="1825625"/>
-            <a:ext cx="3464750" cy="3738939"/>
+            <a:off x="613468" y="1825625"/>
+            <a:ext cx="4481046" cy="4715210"/>
           </a:xfrm>
           <a:prstGeom prst="rect">
             <a:avLst/>
@@ -4834,7 +4825,7 @@
                 <a:ea typeface="Segoe UI Black" panose="020B0A02040204020203" pitchFamily="34" charset="0"/>
                 <a:cs typeface="Segoe UI Black" panose="020B0A02040204020203" pitchFamily="34" charset="0"/>
               </a:rPr>
-              <a:t>Results (2)</a:t>
+              <a:t>Model Selection (2)</a:t>
             </a:r>
           </a:p>
         </p:txBody>
@@ -4851,8 +4842,8 @@
         </p:nvSpPr>
         <p:spPr>
           <a:xfrm>
-            <a:off x="4572000" y="1825625"/>
-            <a:ext cx="6781800" cy="4351338"/>
+            <a:off x="5094514" y="1825625"/>
+            <a:ext cx="6259286" cy="4351338"/>
           </a:xfrm>
         </p:spPr>
         <p:txBody>
@@ -4864,6 +4855,15 @@
                 <a:latin typeface="Segoe UI Light" panose="020B0502040204020203" pitchFamily="34" charset="0"/>
                 <a:cs typeface="Segoe UI Light" panose="020B0502040204020203" pitchFamily="34" charset="0"/>
               </a:rPr>
+              <a:t>LDA has no hyper parameters to be tuned</a:t>
+            </a:r>
+          </a:p>
+          <a:p>
+            <a:r>
+              <a:rPr lang="en-US" dirty="0">
+                <a:latin typeface="Segoe UI Light" panose="020B0502040204020203" pitchFamily="34" charset="0"/>
+                <a:cs typeface="Segoe UI Light" panose="020B0502040204020203" pitchFamily="34" charset="0"/>
+              </a:rPr>
               <a:t>Results might be improved by using Random forest with tuned parameters given that without tuning, the model performed reasonably well</a:t>
             </a:r>
           </a:p>
@@ -4871,46 +4871,20 @@
       </p:sp>
       <p:sp>
         <p:nvSpPr>
-          <p:cNvPr id="19" name="Rectangle 18"/>
+          <p:cNvPr id="12" name="Rectangle 11">
+            <a:extLst>
+              <a:ext uri="{FF2B5EF4-FFF2-40B4-BE49-F238E27FC236}">
+                <a16:creationId xmlns:a16="http://schemas.microsoft.com/office/drawing/2014/main" id="{C06C2AE0-8E38-4D27-9027-E2394F36B658}"/>
+              </a:ext>
+            </a:extLst>
+          </p:cNvPr>
           <p:cNvSpPr/>
           <p:nvPr/>
         </p:nvSpPr>
         <p:spPr>
           <a:xfrm>
-            <a:off x="1096949" y="5532088"/>
-            <a:ext cx="1959062" cy="369332"/>
-          </a:xfrm>
-          <a:prstGeom prst="rect">
-            <a:avLst/>
-          </a:prstGeom>
-        </p:spPr>
-        <p:txBody>
-          <a:bodyPr wrap="none">
-            <a:spAutoFit/>
-          </a:bodyPr>
-          <a:lstStyle/>
-          <a:p>
-            <a:pPr algn="ctr"/>
-            <a:r>
-              <a:rPr lang="en-US" dirty="0">
-                <a:latin typeface="Segoe UI Light" panose="020B0502040204020203" pitchFamily="34" charset="0"/>
-                <a:cs typeface="Segoe UI Light" panose="020B0502040204020203" pitchFamily="34" charset="0"/>
-              </a:rPr>
-              <a:t>Topic Vectors Only</a:t>
-            </a:r>
-          </a:p>
-        </p:txBody>
-      </p:sp>
-      <p:sp>
-        <p:nvSpPr>
-          <p:cNvPr id="20" name="Rectangle 19"/>
-          <p:cNvSpPr/>
-          <p:nvPr/>
-        </p:nvSpPr>
-        <p:spPr>
-          <a:xfrm>
-            <a:off x="613468" y="2006375"/>
-            <a:ext cx="1741038" cy="130336"/>
+            <a:off x="613468" y="2989198"/>
+            <a:ext cx="2447319" cy="183209"/>
           </a:xfrm>
           <a:prstGeom prst="rect">
             <a:avLst/>
@@ -4958,20 +4932,16 @@
       </p:sp>
       <p:sp>
         <p:nvSpPr>
-          <p:cNvPr id="12" name="Rectangle 11">
-            <a:extLst>
-              <a:ext uri="{FF2B5EF4-FFF2-40B4-BE49-F238E27FC236}">
-                <a16:creationId xmlns:a16="http://schemas.microsoft.com/office/drawing/2014/main" id="{C06C2AE0-8E38-4D27-9027-E2394F36B658}"/>
-              </a:ext>
-            </a:extLst>
+          <p:cNvPr id="9" name="Rectangle 8">
+            <a:extLst/>
           </p:cNvPr>
           <p:cNvSpPr/>
           <p:nvPr/>
         </p:nvSpPr>
         <p:spPr>
           <a:xfrm>
-            <a:off x="613468" y="2765264"/>
-            <a:ext cx="1741038" cy="130336"/>
+            <a:off x="613468" y="2021924"/>
+            <a:ext cx="2447319" cy="183209"/>
           </a:xfrm>
           <a:prstGeom prst="rect">
             <a:avLst/>
@@ -5068,14 +5038,14 @@
                 <a:ea typeface="Segoe UI Black" panose="020B0A02040204020203" pitchFamily="34" charset="0"/>
                 <a:cs typeface="Segoe UI Black" panose="020B0A02040204020203" pitchFamily="34" charset="0"/>
               </a:rPr>
-              <a:t>Future steps </a:t>
-            </a:r>
-          </a:p>
-        </p:txBody>
-      </p:sp>
-      <p:sp>
-        <p:nvSpPr>
-          <p:cNvPr id="3" name="Content Placeholder 2"/>
+              <a:t>Optimizing Random Forest</a:t>
+            </a:r>
+          </a:p>
+        </p:txBody>
+      </p:sp>
+      <p:sp>
+        <p:nvSpPr>
+          <p:cNvPr id="4" name="Content Placeholder 3"/>
           <p:cNvSpPr>
             <a:spLocks noGrp="1"/>
           </p:cNvSpPr>
@@ -5085,55 +5055,412 @@
         </p:nvSpPr>
         <p:spPr/>
         <p:txBody>
-          <a:bodyPr>
-            <a:normAutofit lnSpcReduction="10000"/>
-          </a:bodyPr>
-          <a:lstStyle/>
-          <a:p>
-            <a:r>
-              <a:rPr lang="en-US" dirty="0">
-                <a:latin typeface="Segoe UI Light" panose="020B0502040204020203" pitchFamily="34" charset="0"/>
-                <a:cs typeface="Segoe UI Light" panose="020B0502040204020203" pitchFamily="34" charset="0"/>
-              </a:rPr>
-              <a:t>The results above suggest that the model performs fairly well under Latent Discriminant Analysis, yet here are some areas of improvement and/or further areas of research.</a:t>
-            </a:r>
-          </a:p>
-          <a:p>
-            <a:pPr lvl="1"/>
-            <a:r>
-              <a:rPr lang="en-US" dirty="0">
-                <a:latin typeface="Segoe UI Light" panose="020B0502040204020203" pitchFamily="34" charset="0"/>
-                <a:cs typeface="Segoe UI Light" panose="020B0502040204020203" pitchFamily="34" charset="0"/>
-              </a:rPr>
-              <a:t>Word misspellings in feature engineering. Train the models with a misspelling indicator, as this could be a feature that might be important.</a:t>
-            </a:r>
-          </a:p>
-          <a:p>
-            <a:pPr lvl="1"/>
-            <a:r>
-              <a:rPr lang="en-US" dirty="0">
-                <a:latin typeface="Segoe UI Light" panose="020B0502040204020203" pitchFamily="34" charset="0"/>
-                <a:cs typeface="Segoe UI Light" panose="020B0502040204020203" pitchFamily="34" charset="0"/>
-              </a:rPr>
-              <a:t>Look at this data across time -- there could be difference in detecting spam based on information around the time period -- for example, will adding month pick up information about holidays and the holiday vacation experience that could help detect fake reviews.</a:t>
-            </a:r>
-          </a:p>
-          <a:p>
-            <a:pPr lvl="1"/>
-            <a:r>
-              <a:rPr lang="en-US" dirty="0">
-                <a:latin typeface="Segoe UI Light" panose="020B0502040204020203" pitchFamily="34" charset="0"/>
-                <a:cs typeface="Segoe UI Light" panose="020B0502040204020203" pitchFamily="34" charset="0"/>
-              </a:rPr>
-              <a:t>Would having transaction data on each review show interesting results -- for example, the time of each post, and location of the IP address that sent the post.</a:t>
-            </a:r>
+          <a:bodyPr/>
+          <a:lstStyle/>
+          <a:p>
+            <a:r>
+              <a:rPr lang="en-US" dirty="0"/>
+              <a:t>Number of Trees to grow: 1000</a:t>
+            </a:r>
+          </a:p>
+          <a:p>
+            <a:r>
+              <a:rPr lang="en-US" dirty="0"/>
+              <a:t>Depth of Trees: [15,25,50,75],</a:t>
+            </a:r>
+          </a:p>
+          <a:p>
+            <a:r>
+              <a:rPr lang="en-US" dirty="0"/>
+              <a:t>Determine node splits by using Gini Entropy</a:t>
+            </a:r>
+          </a:p>
+          <a:p>
+            <a:r>
+              <a:rPr lang="en-US" dirty="0"/>
+              <a:t>Minimum Number of Samples in each node: [50,100]</a:t>
+            </a:r>
+          </a:p>
+          <a:p>
+            <a:r>
+              <a:rPr lang="en-US" dirty="0"/>
+              <a:t>Using: 10-Fold Cross Validation</a:t>
+            </a:r>
+          </a:p>
+          <a:p>
+            <a:pPr marL="0" indent="0">
+              <a:buNone/>
+            </a:pPr>
+            <a:endParaRPr lang="en-US" dirty="0"/>
+          </a:p>
+          <a:p>
+            <a:pPr marL="0" indent="0">
+              <a:buNone/>
+            </a:pPr>
+            <a:endParaRPr lang="en-US" dirty="0"/>
           </a:p>
         </p:txBody>
       </p:sp>
     </p:spTree>
     <p:extLst>
       <p:ext uri="{BB962C8B-B14F-4D97-AF65-F5344CB8AC3E}">
-        <p14:creationId xmlns:p14="http://schemas.microsoft.com/office/powerpoint/2010/main" val="673977572"/>
+        <p14:creationId xmlns:p14="http://schemas.microsoft.com/office/powerpoint/2010/main" val="1727069936"/>
+      </p:ext>
+    </p:extLst>
+  </p:cSld>
+  <p:clrMapOvr>
+    <a:masterClrMapping/>
+  </p:clrMapOvr>
+</p:sld>
+</file>
+
+<file path=ppt/slides/slide17.xml><?xml version="1.0" encoding="utf-8"?>
+<p:sld xmlns:a="http://schemas.openxmlformats.org/drawingml/2006/main" xmlns:r="http://schemas.openxmlformats.org/officeDocument/2006/relationships" xmlns:p="http://schemas.openxmlformats.org/presentationml/2006/main">
+  <p:cSld>
+    <p:spTree>
+      <p:nvGrpSpPr>
+        <p:cNvPr id="1" name=""/>
+        <p:cNvGrpSpPr/>
+        <p:nvPr/>
+      </p:nvGrpSpPr>
+      <p:grpSpPr>
+        <a:xfrm>
+          <a:off x="0" y="0"/>
+          <a:ext cx="0" cy="0"/>
+          <a:chOff x="0" y="0"/>
+          <a:chExt cx="0" cy="0"/>
+        </a:xfrm>
+      </p:grpSpPr>
+      <p:sp>
+        <p:nvSpPr>
+          <p:cNvPr id="2" name="Title 1"/>
+          <p:cNvSpPr>
+            <a:spLocks noGrp="1"/>
+          </p:cNvSpPr>
+          <p:nvPr>
+            <p:ph type="title"/>
+          </p:nvPr>
+        </p:nvSpPr>
+        <p:spPr/>
+        <p:txBody>
+          <a:bodyPr/>
+          <a:lstStyle/>
+          <a:p>
+            <a:r>
+              <a:rPr lang="en-US" dirty="0">
+                <a:latin typeface="Segoe UI Black" panose="020B0A02040204020203" pitchFamily="34" charset="0"/>
+                <a:ea typeface="Segoe UI Black" panose="020B0A02040204020203" pitchFamily="34" charset="0"/>
+                <a:cs typeface="Segoe UI Black" panose="020B0A02040204020203" pitchFamily="34" charset="0"/>
+              </a:rPr>
+              <a:t>Results (1)</a:t>
+            </a:r>
+          </a:p>
+        </p:txBody>
+      </p:sp>
+      <p:sp>
+        <p:nvSpPr>
+          <p:cNvPr id="4" name="Content Placeholder 3"/>
+          <p:cNvSpPr>
+            <a:spLocks noGrp="1"/>
+          </p:cNvSpPr>
+          <p:nvPr>
+            <p:ph idx="1"/>
+          </p:nvPr>
+        </p:nvSpPr>
+        <p:spPr/>
+        <p:txBody>
+          <a:bodyPr/>
+          <a:lstStyle/>
+          <a:p>
+            <a:r>
+              <a:rPr lang="en-US" dirty="0"/>
+              <a:t>Best Accuracy: 84.6% </a:t>
+            </a:r>
+          </a:p>
+          <a:p>
+            <a:pPr lvl="1"/>
+            <a:r>
+              <a:rPr lang="en-US" dirty="0"/>
+              <a:t>1.6 % improvement compared to LDA</a:t>
+            </a:r>
+          </a:p>
+          <a:p>
+            <a:pPr lvl="1"/>
+            <a:r>
+              <a:rPr lang="en-US" dirty="0"/>
+              <a:t>+ 20% improvement compared to untuned Random Forest model</a:t>
+            </a:r>
+          </a:p>
+          <a:p>
+            <a:r>
+              <a:rPr lang="en-US" dirty="0"/>
+              <a:t>Best Model:</a:t>
+            </a:r>
+          </a:p>
+          <a:p>
+            <a:pPr lvl="1"/>
+            <a:r>
+              <a:rPr lang="en-US" dirty="0"/>
+              <a:t>Max Tree Depth = 50</a:t>
+            </a:r>
+          </a:p>
+          <a:p>
+            <a:pPr lvl="1"/>
+            <a:r>
+              <a:rPr lang="en-US" dirty="0"/>
+              <a:t>Minimum Samples per Node = 50</a:t>
+            </a:r>
+          </a:p>
+          <a:p>
+            <a:pPr lvl="1"/>
+            <a:endParaRPr lang="en-US" dirty="0"/>
+          </a:p>
+          <a:p>
+            <a:endParaRPr lang="en-US" dirty="0"/>
+          </a:p>
+        </p:txBody>
+      </p:sp>
+    </p:spTree>
+    <p:extLst>
+      <p:ext uri="{BB962C8B-B14F-4D97-AF65-F5344CB8AC3E}">
+        <p14:creationId xmlns:p14="http://schemas.microsoft.com/office/powerpoint/2010/main" val="2749024399"/>
+      </p:ext>
+    </p:extLst>
+  </p:cSld>
+  <p:clrMapOvr>
+    <a:masterClrMapping/>
+  </p:clrMapOvr>
+</p:sld>
+</file>
+
+<file path=ppt/slides/slide18.xml><?xml version="1.0" encoding="utf-8"?>
+<p:sld xmlns:a="http://schemas.openxmlformats.org/drawingml/2006/main" xmlns:r="http://schemas.openxmlformats.org/officeDocument/2006/relationships" xmlns:p="http://schemas.openxmlformats.org/presentationml/2006/main">
+  <p:cSld>
+    <p:spTree>
+      <p:nvGrpSpPr>
+        <p:cNvPr id="1" name=""/>
+        <p:cNvGrpSpPr/>
+        <p:nvPr/>
+      </p:nvGrpSpPr>
+      <p:grpSpPr>
+        <a:xfrm>
+          <a:off x="0" y="0"/>
+          <a:ext cx="0" cy="0"/>
+          <a:chOff x="0" y="0"/>
+          <a:chExt cx="0" cy="0"/>
+        </a:xfrm>
+      </p:grpSpPr>
+      <p:sp>
+        <p:nvSpPr>
+          <p:cNvPr id="2" name="Title 1"/>
+          <p:cNvSpPr>
+            <a:spLocks noGrp="1"/>
+          </p:cNvSpPr>
+          <p:nvPr>
+            <p:ph type="title"/>
+          </p:nvPr>
+        </p:nvSpPr>
+        <p:spPr/>
+        <p:txBody>
+          <a:bodyPr/>
+          <a:lstStyle/>
+          <a:p>
+            <a:r>
+              <a:rPr lang="en-US" dirty="0">
+                <a:latin typeface="Segoe UI Black" panose="020B0A02040204020203" pitchFamily="34" charset="0"/>
+                <a:ea typeface="Segoe UI Black" panose="020B0A02040204020203" pitchFamily="34" charset="0"/>
+                <a:cs typeface="Segoe UI Black" panose="020B0A02040204020203" pitchFamily="34" charset="0"/>
+              </a:rPr>
+              <a:t>Results (2)</a:t>
+            </a:r>
+          </a:p>
+        </p:txBody>
+      </p:sp>
+      <p:sp>
+        <p:nvSpPr>
+          <p:cNvPr id="4" name="Content Placeholder 3"/>
+          <p:cNvSpPr>
+            <a:spLocks noGrp="1"/>
+          </p:cNvSpPr>
+          <p:nvPr>
+            <p:ph idx="1"/>
+          </p:nvPr>
+        </p:nvSpPr>
+        <p:spPr>
+          <a:xfrm>
+            <a:off x="838200" y="1825625"/>
+            <a:ext cx="6365033" cy="4351338"/>
+          </a:xfrm>
+        </p:spPr>
+        <p:txBody>
+          <a:bodyPr/>
+          <a:lstStyle/>
+          <a:p>
+            <a:r>
+              <a:rPr lang="en-US" dirty="0"/>
+              <a:t>Mean Decrease in Impurity (MDI), we can determine feature importance.</a:t>
+            </a:r>
+          </a:p>
+          <a:p>
+            <a:r>
+              <a:rPr lang="en-US" dirty="0"/>
+              <a:t>The figure to the right shows what is most important in determining Deceptive vs Genuine reviews</a:t>
+            </a:r>
+          </a:p>
+          <a:p>
+            <a:pPr lvl="1"/>
+            <a:r>
+              <a:rPr lang="en-US" dirty="0"/>
+              <a:t>Topic Vectors and 3 are most important</a:t>
+            </a:r>
+          </a:p>
+          <a:p>
+            <a:pPr lvl="1"/>
+            <a:r>
+              <a:rPr lang="en-US" dirty="0"/>
+              <a:t>The use of punctuation is important</a:t>
+            </a:r>
+          </a:p>
+        </p:txBody>
+      </p:sp>
+      <p:pic>
+        <p:nvPicPr>
+          <p:cNvPr id="3" name="Picture 2"/>
+          <p:cNvPicPr>
+            <a:picLocks noChangeAspect="1"/>
+          </p:cNvPicPr>
+          <p:nvPr/>
+        </p:nvPicPr>
+        <p:blipFill>
+          <a:blip r:embed="rId2"/>
+          <a:stretch>
+            <a:fillRect/>
+          </a:stretch>
+        </p:blipFill>
+        <p:spPr>
+          <a:xfrm>
+            <a:off x="8411255" y="1690688"/>
+            <a:ext cx="3028076" cy="2881341"/>
+          </a:xfrm>
+          <a:prstGeom prst="rect">
+            <a:avLst/>
+          </a:prstGeom>
+        </p:spPr>
+      </p:pic>
+    </p:spTree>
+    <p:extLst>
+      <p:ext uri="{BB962C8B-B14F-4D97-AF65-F5344CB8AC3E}">
+        <p14:creationId xmlns:p14="http://schemas.microsoft.com/office/powerpoint/2010/main" val="221967657"/>
+      </p:ext>
+    </p:extLst>
+  </p:cSld>
+  <p:clrMapOvr>
+    <a:masterClrMapping/>
+  </p:clrMapOvr>
+</p:sld>
+</file>
+
+<file path=ppt/slides/slide19.xml><?xml version="1.0" encoding="utf-8"?>
+<p:sld xmlns:a="http://schemas.openxmlformats.org/drawingml/2006/main" xmlns:r="http://schemas.openxmlformats.org/officeDocument/2006/relationships" xmlns:p="http://schemas.openxmlformats.org/presentationml/2006/main">
+  <p:cSld>
+    <p:spTree>
+      <p:nvGrpSpPr>
+        <p:cNvPr id="1" name=""/>
+        <p:cNvGrpSpPr/>
+        <p:nvPr/>
+      </p:nvGrpSpPr>
+      <p:grpSpPr>
+        <a:xfrm>
+          <a:off x="0" y="0"/>
+          <a:ext cx="0" cy="0"/>
+          <a:chOff x="0" y="0"/>
+          <a:chExt cx="0" cy="0"/>
+        </a:xfrm>
+      </p:grpSpPr>
+      <p:sp>
+        <p:nvSpPr>
+          <p:cNvPr id="2" name="Title 1"/>
+          <p:cNvSpPr>
+            <a:spLocks noGrp="1"/>
+          </p:cNvSpPr>
+          <p:nvPr>
+            <p:ph type="title"/>
+          </p:nvPr>
+        </p:nvSpPr>
+        <p:spPr/>
+        <p:txBody>
+          <a:bodyPr/>
+          <a:lstStyle/>
+          <a:p>
+            <a:r>
+              <a:rPr lang="en-US" dirty="0">
+                <a:latin typeface="Segoe UI Black" panose="020B0A02040204020203" pitchFamily="34" charset="0"/>
+                <a:ea typeface="Segoe UI Black" panose="020B0A02040204020203" pitchFamily="34" charset="0"/>
+                <a:cs typeface="Segoe UI Black" panose="020B0A02040204020203" pitchFamily="34" charset="0"/>
+              </a:rPr>
+              <a:t>Results (3)</a:t>
+            </a:r>
+          </a:p>
+        </p:txBody>
+      </p:sp>
+      <p:sp>
+        <p:nvSpPr>
+          <p:cNvPr id="4" name="Content Placeholder 3"/>
+          <p:cNvSpPr>
+            <a:spLocks noGrp="1"/>
+          </p:cNvSpPr>
+          <p:nvPr>
+            <p:ph idx="1"/>
+          </p:nvPr>
+        </p:nvSpPr>
+        <p:spPr>
+          <a:xfrm>
+            <a:off x="838200" y="1825625"/>
+            <a:ext cx="6365033" cy="4351338"/>
+          </a:xfrm>
+        </p:spPr>
+        <p:txBody>
+          <a:bodyPr/>
+          <a:lstStyle/>
+          <a:p>
+            <a:pPr marL="0" indent="0">
+              <a:buNone/>
+            </a:pPr>
+            <a:r>
+              <a:rPr lang="en-US" dirty="0"/>
+              <a:t>Looking into each topic vector, we see what types of words impact deceptiveness of a review</a:t>
+            </a:r>
+          </a:p>
+        </p:txBody>
+      </p:sp>
+      <p:pic>
+        <p:nvPicPr>
+          <p:cNvPr id="3" name="Picture 2"/>
+          <p:cNvPicPr>
+            <a:picLocks noChangeAspect="1"/>
+          </p:cNvPicPr>
+          <p:nvPr/>
+        </p:nvPicPr>
+        <p:blipFill>
+          <a:blip r:embed="rId2"/>
+          <a:stretch>
+            <a:fillRect/>
+          </a:stretch>
+        </p:blipFill>
+        <p:spPr>
+          <a:xfrm>
+            <a:off x="8881004" y="766763"/>
+            <a:ext cx="2219325" cy="5410200"/>
+          </a:xfrm>
+          <a:prstGeom prst="rect">
+            <a:avLst/>
+          </a:prstGeom>
+        </p:spPr>
+      </p:pic>
+    </p:spTree>
+    <p:extLst>
+      <p:ext uri="{BB962C8B-B14F-4D97-AF65-F5344CB8AC3E}">
+        <p14:creationId xmlns:p14="http://schemas.microsoft.com/office/powerpoint/2010/main" val="1720474140"/>
       </p:ext>
     </p:extLst>
   </p:cSld>
@@ -5271,6 +5598,249 @@
     <p:extLst>
       <p:ext uri="{BB962C8B-B14F-4D97-AF65-F5344CB8AC3E}">
         <p14:creationId xmlns:p14="http://schemas.microsoft.com/office/powerpoint/2010/main" val="311781924"/>
+      </p:ext>
+    </p:extLst>
+  </p:cSld>
+  <p:clrMapOvr>
+    <a:masterClrMapping/>
+  </p:clrMapOvr>
+</p:sld>
+</file>
+
+<file path=ppt/slides/slide20.xml><?xml version="1.0" encoding="utf-8"?>
+<p:sld xmlns:a="http://schemas.openxmlformats.org/drawingml/2006/main" xmlns:r="http://schemas.openxmlformats.org/officeDocument/2006/relationships" xmlns:p="http://schemas.openxmlformats.org/presentationml/2006/main">
+  <p:cSld>
+    <p:spTree>
+      <p:nvGrpSpPr>
+        <p:cNvPr id="1" name=""/>
+        <p:cNvGrpSpPr/>
+        <p:nvPr/>
+      </p:nvGrpSpPr>
+      <p:grpSpPr>
+        <a:xfrm>
+          <a:off x="0" y="0"/>
+          <a:ext cx="0" cy="0"/>
+          <a:chOff x="0" y="0"/>
+          <a:chExt cx="0" cy="0"/>
+        </a:xfrm>
+      </p:grpSpPr>
+      <p:sp>
+        <p:nvSpPr>
+          <p:cNvPr id="2" name="Title 1"/>
+          <p:cNvSpPr>
+            <a:spLocks noGrp="1"/>
+          </p:cNvSpPr>
+          <p:nvPr>
+            <p:ph type="title"/>
+          </p:nvPr>
+        </p:nvSpPr>
+        <p:spPr/>
+        <p:txBody>
+          <a:bodyPr/>
+          <a:lstStyle/>
+          <a:p>
+            <a:r>
+              <a:rPr lang="en-US" dirty="0">
+                <a:latin typeface="Segoe UI Black" panose="020B0A02040204020203" pitchFamily="34" charset="0"/>
+                <a:ea typeface="Segoe UI Black" panose="020B0A02040204020203" pitchFamily="34" charset="0"/>
+                <a:cs typeface="Segoe UI Black" panose="020B0A02040204020203" pitchFamily="34" charset="0"/>
+              </a:rPr>
+              <a:t>Results (3)</a:t>
+            </a:r>
+          </a:p>
+        </p:txBody>
+      </p:sp>
+      <p:sp>
+        <p:nvSpPr>
+          <p:cNvPr id="4" name="Content Placeholder 3"/>
+          <p:cNvSpPr>
+            <a:spLocks noGrp="1"/>
+          </p:cNvSpPr>
+          <p:nvPr>
+            <p:ph idx="1"/>
+          </p:nvPr>
+        </p:nvSpPr>
+        <p:spPr>
+          <a:xfrm>
+            <a:off x="838201" y="1825625"/>
+            <a:ext cx="4467578" cy="4351338"/>
+          </a:xfrm>
+        </p:spPr>
+        <p:txBody>
+          <a:bodyPr/>
+          <a:lstStyle/>
+          <a:p>
+            <a:pPr marL="0" indent="0">
+              <a:buNone/>
+            </a:pPr>
+            <a:r>
+              <a:rPr lang="en-US" dirty="0"/>
+              <a:t>Descriptively, there is a noticeable difference in punctuation count between truthful and deceptive reviews. </a:t>
+            </a:r>
+          </a:p>
+        </p:txBody>
+      </p:sp>
+      <p:pic>
+        <p:nvPicPr>
+          <p:cNvPr id="5" name="Picture 4"/>
+          <p:cNvPicPr>
+            <a:picLocks noChangeAspect="1"/>
+          </p:cNvPicPr>
+          <p:nvPr/>
+        </p:nvPicPr>
+        <p:blipFill>
+          <a:blip r:embed="rId2"/>
+          <a:stretch>
+            <a:fillRect/>
+          </a:stretch>
+        </p:blipFill>
+        <p:spPr>
+          <a:xfrm>
+            <a:off x="5671961" y="1597375"/>
+            <a:ext cx="6384572" cy="4579588"/>
+          </a:xfrm>
+          <a:prstGeom prst="rect">
+            <a:avLst/>
+          </a:prstGeom>
+        </p:spPr>
+      </p:pic>
+    </p:spTree>
+    <p:extLst>
+      <p:ext uri="{BB962C8B-B14F-4D97-AF65-F5344CB8AC3E}">
+        <p14:creationId xmlns:p14="http://schemas.microsoft.com/office/powerpoint/2010/main" val="1797200982"/>
+      </p:ext>
+    </p:extLst>
+  </p:cSld>
+  <p:clrMapOvr>
+    <a:masterClrMapping/>
+  </p:clrMapOvr>
+</p:sld>
+</file>
+
+<file path=ppt/slides/slide21.xml><?xml version="1.0" encoding="utf-8"?>
+<p:sld xmlns:a="http://schemas.openxmlformats.org/drawingml/2006/main" xmlns:r="http://schemas.openxmlformats.org/officeDocument/2006/relationships" xmlns:p="http://schemas.openxmlformats.org/presentationml/2006/main">
+  <p:cSld>
+    <p:spTree>
+      <p:nvGrpSpPr>
+        <p:cNvPr id="1" name=""/>
+        <p:cNvGrpSpPr/>
+        <p:nvPr/>
+      </p:nvGrpSpPr>
+      <p:grpSpPr>
+        <a:xfrm>
+          <a:off x="0" y="0"/>
+          <a:ext cx="0" cy="0"/>
+          <a:chOff x="0" y="0"/>
+          <a:chExt cx="0" cy="0"/>
+        </a:xfrm>
+      </p:grpSpPr>
+      <p:sp>
+        <p:nvSpPr>
+          <p:cNvPr id="2" name="Title 1"/>
+          <p:cNvSpPr>
+            <a:spLocks noGrp="1"/>
+          </p:cNvSpPr>
+          <p:nvPr>
+            <p:ph type="title"/>
+          </p:nvPr>
+        </p:nvSpPr>
+        <p:spPr/>
+        <p:txBody>
+          <a:bodyPr/>
+          <a:lstStyle/>
+          <a:p>
+            <a:r>
+              <a:rPr lang="en-US" dirty="0">
+                <a:latin typeface="Segoe UI Black" panose="020B0A02040204020203" pitchFamily="34" charset="0"/>
+                <a:ea typeface="Segoe UI Black" panose="020B0A02040204020203" pitchFamily="34" charset="0"/>
+                <a:cs typeface="Segoe UI Black" panose="020B0A02040204020203" pitchFamily="34" charset="0"/>
+              </a:rPr>
+              <a:t>Future steps </a:t>
+            </a:r>
+          </a:p>
+        </p:txBody>
+      </p:sp>
+      <p:sp>
+        <p:nvSpPr>
+          <p:cNvPr id="3" name="Content Placeholder 2"/>
+          <p:cNvSpPr>
+            <a:spLocks noGrp="1"/>
+          </p:cNvSpPr>
+          <p:nvPr>
+            <p:ph idx="1"/>
+          </p:nvPr>
+        </p:nvSpPr>
+        <p:spPr/>
+        <p:txBody>
+          <a:bodyPr>
+            <a:normAutofit fontScale="92500" lnSpcReduction="10000"/>
+          </a:bodyPr>
+          <a:lstStyle/>
+          <a:p>
+            <a:r>
+              <a:rPr lang="en-US" dirty="0">
+                <a:latin typeface="Segoe UI Light" panose="020B0502040204020203" pitchFamily="34" charset="0"/>
+                <a:cs typeface="Segoe UI Light" panose="020B0502040204020203" pitchFamily="34" charset="0"/>
+              </a:rPr>
+              <a:t>The results above suggest that the model performs fairly well under Random Forest, yet here are some areas of improvement and/or further areas of research.</a:t>
+            </a:r>
+          </a:p>
+          <a:p>
+            <a:pPr lvl="1"/>
+            <a:r>
+              <a:rPr lang="en-US" dirty="0">
+                <a:latin typeface="Segoe UI Light" panose="020B0502040204020203" pitchFamily="34" charset="0"/>
+                <a:cs typeface="Segoe UI Light" panose="020B0502040204020203" pitchFamily="34" charset="0"/>
+              </a:rPr>
+              <a:t>The number of features is large compared to the number of observations</a:t>
+            </a:r>
+          </a:p>
+          <a:p>
+            <a:pPr lvl="2"/>
+            <a:r>
+              <a:rPr lang="en-US" dirty="0">
+                <a:latin typeface="Segoe UI Light" panose="020B0502040204020203" pitchFamily="34" charset="0"/>
+                <a:cs typeface="Segoe UI Light" panose="020B0502040204020203" pitchFamily="34" charset="0"/>
+              </a:rPr>
+              <a:t>Potentially, tune LSI, reduce the Term Frequency-Inverse Document Frequency to a smaller number of topics</a:t>
+            </a:r>
+          </a:p>
+          <a:p>
+            <a:pPr lvl="1"/>
+            <a:r>
+              <a:rPr lang="en-US" dirty="0">
+                <a:latin typeface="Segoe UI Light" panose="020B0502040204020203" pitchFamily="34" charset="0"/>
+                <a:cs typeface="Segoe UI Light" panose="020B0502040204020203" pitchFamily="34" charset="0"/>
+              </a:rPr>
+              <a:t>Word misspellings in feature engineering. Train the models with a misspelling indicator, as this could be a feature that might be important.</a:t>
+            </a:r>
+          </a:p>
+          <a:p>
+            <a:pPr lvl="1"/>
+            <a:r>
+              <a:rPr lang="en-US" dirty="0">
+                <a:latin typeface="Segoe UI Light" panose="020B0502040204020203" pitchFamily="34" charset="0"/>
+                <a:cs typeface="Segoe UI Light" panose="020B0502040204020203" pitchFamily="34" charset="0"/>
+              </a:rPr>
+              <a:t>Look at this data across time -- there could be difference in detecting spam based on information around the time period -- for example, will adding month pick up information about holidays and the holiday vacation experience that could help detect fake reviews.</a:t>
+            </a:r>
+          </a:p>
+          <a:p>
+            <a:pPr lvl="1"/>
+            <a:r>
+              <a:rPr lang="en-US" dirty="0">
+                <a:latin typeface="Segoe UI Light" panose="020B0502040204020203" pitchFamily="34" charset="0"/>
+                <a:cs typeface="Segoe UI Light" panose="020B0502040204020203" pitchFamily="34" charset="0"/>
+              </a:rPr>
+              <a:t>Would having transaction data on each review show interesting results -- for example, the time of each post, and location of the IP address that sent the post.</a:t>
+            </a:r>
+          </a:p>
+        </p:txBody>
+      </p:sp>
+    </p:spTree>
+    <p:extLst>
+      <p:ext uri="{BB962C8B-B14F-4D97-AF65-F5344CB8AC3E}">
+        <p14:creationId xmlns:p14="http://schemas.microsoft.com/office/powerpoint/2010/main" val="673977572"/>
       </p:ext>
     </p:extLst>
   </p:cSld>

</xml_diff>